<commit_message>
update document and presentation
</commit_message>
<xml_diff>
--- a/final project presentation.pptx
+++ b/final project presentation.pptx
@@ -17,7 +17,7 @@
     <p:sldId id="310" r:id="rId8"/>
     <p:sldId id="311" r:id="rId9"/>
     <p:sldId id="312" r:id="rId10"/>
-    <p:sldId id="313" r:id="rId11"/>
+    <p:sldId id="319" r:id="rId11"/>
     <p:sldId id="314" r:id="rId12"/>
     <p:sldId id="315" r:id="rId13"/>
     <p:sldId id="316" r:id="rId14"/>
@@ -375,11 +375,11 @@
           <c:showBubbleSize val="0"/>
         </c:dLbls>
         <c:smooth val="0"/>
-        <c:axId val="425890488"/>
-        <c:axId val="425897544"/>
+        <c:axId val="281299584"/>
+        <c:axId val="10352056"/>
       </c:lineChart>
       <c:catAx>
-        <c:axId val="425890488"/>
+        <c:axId val="281299584"/>
         <c:scaling>
           <c:orientation val="minMax"/>
         </c:scaling>
@@ -475,7 +475,7 @@
             <a:endParaRPr lang="en-US"/>
           </a:p>
         </c:txPr>
-        <c:crossAx val="425897544"/>
+        <c:crossAx val="10352056"/>
         <c:crosses val="autoZero"/>
         <c:auto val="1"/>
         <c:lblAlgn val="ctr"/>
@@ -483,7 +483,7 @@
         <c:noMultiLvlLbl val="0"/>
       </c:catAx>
       <c:valAx>
-        <c:axId val="425897544"/>
+        <c:axId val="10352056"/>
         <c:scaling>
           <c:orientation val="minMax"/>
         </c:scaling>
@@ -587,7 +587,7 @@
             <a:endParaRPr lang="en-US"/>
           </a:p>
         </c:txPr>
-        <c:crossAx val="425890488"/>
+        <c:crossAx val="281299584"/>
         <c:crosses val="autoZero"/>
         <c:crossBetween val="between"/>
       </c:valAx>
@@ -921,11 +921,11 @@
           <c:showBubbleSize val="0"/>
         </c:dLbls>
         <c:smooth val="0"/>
-        <c:axId val="426929264"/>
-        <c:axId val="428646264"/>
+        <c:axId val="281025120"/>
+        <c:axId val="157313408"/>
       </c:lineChart>
       <c:catAx>
-        <c:axId val="426929264"/>
+        <c:axId val="281025120"/>
         <c:scaling>
           <c:orientation val="minMax"/>
         </c:scaling>
@@ -1021,7 +1021,7 @@
             <a:endParaRPr lang="en-US"/>
           </a:p>
         </c:txPr>
-        <c:crossAx val="428646264"/>
+        <c:crossAx val="157313408"/>
         <c:crosses val="autoZero"/>
         <c:auto val="1"/>
         <c:lblAlgn val="ctr"/>
@@ -1029,7 +1029,7 @@
         <c:noMultiLvlLbl val="0"/>
       </c:catAx>
       <c:valAx>
-        <c:axId val="428646264"/>
+        <c:axId val="157313408"/>
         <c:scaling>
           <c:orientation val="minMax"/>
         </c:scaling>
@@ -1133,7 +1133,7 @@
             <a:endParaRPr lang="en-US"/>
           </a:p>
         </c:txPr>
-        <c:crossAx val="426929264"/>
+        <c:crossAx val="281025120"/>
         <c:crosses val="autoZero"/>
         <c:crossBetween val="between"/>
       </c:valAx>
@@ -2376,7 +2376,7 @@
           <a:p>
             <a:fld id="{D9ABE613-1EEF-444A-BFB9-425BD7744BD8}" type="datetimeFigureOut">
               <a:rPr lang="en-US" smtClean="0"/>
-              <a:t>3/28/2017</a:t>
+              <a:t>29/03/2017</a:t>
             </a:fld>
             <a:endParaRPr lang="en-US"/>
           </a:p>
@@ -2772,7 +2772,7 @@
           <a:p>
             <a:fld id="{3F07D8B1-1CC1-4703-9B12-118085B9FDED}" type="datetimeFigureOut">
               <a:rPr lang="en-US" smtClean="0"/>
-              <a:t>3/28/2017</a:t>
+              <a:t>29/03/2017</a:t>
             </a:fld>
             <a:endParaRPr lang="en-US"/>
           </a:p>
@@ -2940,7 +2940,7 @@
           <a:p>
             <a:fld id="{3F07D8B1-1CC1-4703-9B12-118085B9FDED}" type="datetimeFigureOut">
               <a:rPr lang="en-US" smtClean="0"/>
-              <a:t>3/28/2017</a:t>
+              <a:t>29/03/2017</a:t>
             </a:fld>
             <a:endParaRPr lang="en-US"/>
           </a:p>
@@ -3118,7 +3118,7 @@
           <a:p>
             <a:fld id="{3F07D8B1-1CC1-4703-9B12-118085B9FDED}" type="datetimeFigureOut">
               <a:rPr lang="en-US" smtClean="0"/>
-              <a:t>3/28/2017</a:t>
+              <a:t>29/03/2017</a:t>
             </a:fld>
             <a:endParaRPr lang="en-US"/>
           </a:p>
@@ -3370,7 +3370,7 @@
           <a:p>
             <a:fld id="{3F07D8B1-1CC1-4703-9B12-118085B9FDED}" type="datetimeFigureOut">
               <a:rPr lang="en-US" smtClean="0"/>
-              <a:t>3/28/2017</a:t>
+              <a:t>29/03/2017</a:t>
             </a:fld>
             <a:endParaRPr lang="en-US"/>
           </a:p>
@@ -3715,7 +3715,7 @@
           <a:p>
             <a:fld id="{3F07D8B1-1CC1-4703-9B12-118085B9FDED}" type="datetimeFigureOut">
               <a:rPr lang="en-US" smtClean="0"/>
-              <a:t>3/28/2017</a:t>
+              <a:t>29/03/2017</a:t>
             </a:fld>
             <a:endParaRPr lang="en-US"/>
           </a:p>
@@ -3965,7 +3965,7 @@
           <a:p>
             <a:fld id="{3F07D8B1-1CC1-4703-9B12-118085B9FDED}" type="datetimeFigureOut">
               <a:rPr lang="en-US" smtClean="0"/>
-              <a:t>3/28/2017</a:t>
+              <a:t>29/03/2017</a:t>
             </a:fld>
             <a:endParaRPr lang="en-US"/>
           </a:p>
@@ -4201,7 +4201,7 @@
           <a:p>
             <a:fld id="{3F07D8B1-1CC1-4703-9B12-118085B9FDED}" type="datetimeFigureOut">
               <a:rPr lang="en-US" smtClean="0"/>
-              <a:t>3/28/2017</a:t>
+              <a:t>29/03/2017</a:t>
             </a:fld>
             <a:endParaRPr lang="en-US"/>
           </a:p>
@@ -4583,7 +4583,7 @@
           <a:p>
             <a:fld id="{3F07D8B1-1CC1-4703-9B12-118085B9FDED}" type="datetimeFigureOut">
               <a:rPr lang="en-US" smtClean="0"/>
-              <a:t>3/28/2017</a:t>
+              <a:t>29/03/2017</a:t>
             </a:fld>
             <a:endParaRPr lang="en-US"/>
           </a:p>
@@ -4701,7 +4701,7 @@
           <a:p>
             <a:fld id="{3F07D8B1-1CC1-4703-9B12-118085B9FDED}" type="datetimeFigureOut">
               <a:rPr lang="en-US" smtClean="0"/>
-              <a:t>3/28/2017</a:t>
+              <a:t>29/03/2017</a:t>
             </a:fld>
             <a:endParaRPr lang="en-US"/>
           </a:p>
@@ -4796,7 +4796,7 @@
           <a:p>
             <a:fld id="{3F07D8B1-1CC1-4703-9B12-118085B9FDED}" type="datetimeFigureOut">
               <a:rPr lang="en-US" smtClean="0"/>
-              <a:t>3/28/2017</a:t>
+              <a:t>29/03/2017</a:t>
             </a:fld>
             <a:endParaRPr lang="en-US"/>
           </a:p>
@@ -5051,7 +5051,7 @@
           <a:p>
             <a:fld id="{3F07D8B1-1CC1-4703-9B12-118085B9FDED}" type="datetimeFigureOut">
               <a:rPr lang="en-US" smtClean="0"/>
-              <a:t>3/28/2017</a:t>
+              <a:t>29/03/2017</a:t>
             </a:fld>
             <a:endParaRPr lang="en-US"/>
           </a:p>
@@ -5219,7 +5219,7 @@
           <a:p>
             <a:fld id="{3F07D8B1-1CC1-4703-9B12-118085B9FDED}" type="datetimeFigureOut">
               <a:rPr lang="en-US" smtClean="0"/>
-              <a:t>3/28/2017</a:t>
+              <a:t>29/03/2017</a:t>
             </a:fld>
             <a:endParaRPr lang="en-US"/>
           </a:p>
@@ -5502,7 +5502,7 @@
           <a:p>
             <a:fld id="{3F07D8B1-1CC1-4703-9B12-118085B9FDED}" type="datetimeFigureOut">
               <a:rPr lang="en-US" smtClean="0"/>
-              <a:t>3/28/2017</a:t>
+              <a:t>29/03/2017</a:t>
             </a:fld>
             <a:endParaRPr lang="en-US"/>
           </a:p>
@@ -5763,7 +5763,7 @@
           <a:p>
             <a:fld id="{3F07D8B1-1CC1-4703-9B12-118085B9FDED}" type="datetimeFigureOut">
               <a:rPr lang="en-US" smtClean="0"/>
-              <a:t>3/28/2017</a:t>
+              <a:t>29/03/2017</a:t>
             </a:fld>
             <a:endParaRPr lang="en-US"/>
           </a:p>
@@ -6013,7 +6013,7 @@
           <a:p>
             <a:fld id="{3F07D8B1-1CC1-4703-9B12-118085B9FDED}" type="datetimeFigureOut">
               <a:rPr lang="en-US" smtClean="0"/>
-              <a:t>3/28/2017</a:t>
+              <a:t>29/03/2017</a:t>
             </a:fld>
             <a:endParaRPr lang="en-US"/>
           </a:p>
@@ -6321,7 +6321,7 @@
           <a:p>
             <a:fld id="{3F07D8B1-1CC1-4703-9B12-118085B9FDED}" type="datetimeFigureOut">
               <a:rPr lang="en-US" smtClean="0"/>
-              <a:t>3/28/2017</a:t>
+              <a:t>29/03/2017</a:t>
             </a:fld>
             <a:endParaRPr lang="en-US"/>
           </a:p>
@@ -6639,7 +6639,7 @@
           <a:p>
             <a:fld id="{3F07D8B1-1CC1-4703-9B12-118085B9FDED}" type="datetimeFigureOut">
               <a:rPr lang="en-US" smtClean="0"/>
-              <a:t>3/28/2017</a:t>
+              <a:t>29/03/2017</a:t>
             </a:fld>
             <a:endParaRPr lang="en-US"/>
           </a:p>
@@ -6941,7 +6941,7 @@
           <a:p>
             <a:fld id="{3F07D8B1-1CC1-4703-9B12-118085B9FDED}" type="datetimeFigureOut">
               <a:rPr lang="en-US" smtClean="0"/>
-              <a:t>3/28/2017</a:t>
+              <a:t>29/03/2017</a:t>
             </a:fld>
             <a:endParaRPr lang="en-US"/>
           </a:p>
@@ -7308,7 +7308,7 @@
           <a:p>
             <a:fld id="{3F07D8B1-1CC1-4703-9B12-118085B9FDED}" type="datetimeFigureOut">
               <a:rPr lang="en-US" smtClean="0"/>
-              <a:t>3/28/2017</a:t>
+              <a:t>29/03/2017</a:t>
             </a:fld>
             <a:endParaRPr lang="en-US"/>
           </a:p>
@@ -7482,7 +7482,7 @@
           <a:p>
             <a:fld id="{3F07D8B1-1CC1-4703-9B12-118085B9FDED}" type="datetimeFigureOut">
               <a:rPr lang="en-US" smtClean="0"/>
-              <a:t>3/28/2017</a:t>
+              <a:t>29/03/2017</a:t>
             </a:fld>
             <a:endParaRPr lang="en-US"/>
           </a:p>
@@ -7662,7 +7662,7 @@
           <a:p>
             <a:fld id="{3F07D8B1-1CC1-4703-9B12-118085B9FDED}" type="datetimeFigureOut">
               <a:rPr lang="en-US" smtClean="0"/>
-              <a:t>3/28/2017</a:t>
+              <a:t>29/03/2017</a:t>
             </a:fld>
             <a:endParaRPr lang="en-US"/>
           </a:p>
@@ -7907,7 +7907,7 @@
           <a:p>
             <a:fld id="{3F07D8B1-1CC1-4703-9B12-118085B9FDED}" type="datetimeFigureOut">
               <a:rPr lang="en-US" smtClean="0"/>
-              <a:t>3/28/2017</a:t>
+              <a:t>29/03/2017</a:t>
             </a:fld>
             <a:endParaRPr lang="en-US"/>
           </a:p>
@@ -8136,7 +8136,7 @@
           <a:p>
             <a:fld id="{3F07D8B1-1CC1-4703-9B12-118085B9FDED}" type="datetimeFigureOut">
               <a:rPr lang="en-US" smtClean="0"/>
-              <a:t>3/28/2017</a:t>
+              <a:t>29/03/2017</a:t>
             </a:fld>
             <a:endParaRPr lang="en-US"/>
           </a:p>
@@ -8500,7 +8500,7 @@
           <a:p>
             <a:fld id="{3F07D8B1-1CC1-4703-9B12-118085B9FDED}" type="datetimeFigureOut">
               <a:rPr lang="en-US" smtClean="0"/>
-              <a:t>3/28/2017</a:t>
+              <a:t>29/03/2017</a:t>
             </a:fld>
             <a:endParaRPr lang="en-US"/>
           </a:p>
@@ -8617,7 +8617,7 @@
           <a:p>
             <a:fld id="{3F07D8B1-1CC1-4703-9B12-118085B9FDED}" type="datetimeFigureOut">
               <a:rPr lang="en-US" smtClean="0"/>
-              <a:t>3/28/2017</a:t>
+              <a:t>29/03/2017</a:t>
             </a:fld>
             <a:endParaRPr lang="en-US"/>
           </a:p>
@@ -8712,7 +8712,7 @@
           <a:p>
             <a:fld id="{3F07D8B1-1CC1-4703-9B12-118085B9FDED}" type="datetimeFigureOut">
               <a:rPr lang="en-US" smtClean="0"/>
-              <a:t>3/28/2017</a:t>
+              <a:t>29/03/2017</a:t>
             </a:fld>
             <a:endParaRPr lang="en-US"/>
           </a:p>
@@ -8987,7 +8987,7 @@
           <a:p>
             <a:fld id="{3F07D8B1-1CC1-4703-9B12-118085B9FDED}" type="datetimeFigureOut">
               <a:rPr lang="en-US" smtClean="0"/>
-              <a:t>3/28/2017</a:t>
+              <a:t>29/03/2017</a:t>
             </a:fld>
             <a:endParaRPr lang="en-US"/>
           </a:p>
@@ -9239,7 +9239,7 @@
           <a:p>
             <a:fld id="{3F07D8B1-1CC1-4703-9B12-118085B9FDED}" type="datetimeFigureOut">
               <a:rPr lang="en-US" smtClean="0"/>
-              <a:t>3/28/2017</a:t>
+              <a:t>29/03/2017</a:t>
             </a:fld>
             <a:endParaRPr lang="en-US"/>
           </a:p>
@@ -9480,7 +9480,7 @@
           <a:p>
             <a:fld id="{3F07D8B1-1CC1-4703-9B12-118085B9FDED}" type="datetimeFigureOut">
               <a:rPr lang="en-US" smtClean="0"/>
-              <a:t>3/28/2017</a:t>
+              <a:t>29/03/2017</a:t>
             </a:fld>
             <a:endParaRPr lang="en-US"/>
           </a:p>
@@ -10213,7 +10213,7 @@
           <a:p>
             <a:fld id="{3F07D8B1-1CC1-4703-9B12-118085B9FDED}" type="datetimeFigureOut">
               <a:rPr lang="en-US" smtClean="0"/>
-              <a:t>3/28/2017</a:t>
+              <a:t>29/03/2017</a:t>
             </a:fld>
             <a:endParaRPr lang="en-US"/>
           </a:p>
@@ -10926,6 +10926,39 @@
           </a:prstGeom>
         </p:spPr>
       </p:pic>
+      <p:cxnSp>
+        <p:nvCxnSpPr>
+          <p:cNvPr id="5" name="Straight Arrow Connector 4"/>
+          <p:cNvCxnSpPr/>
+          <p:nvPr/>
+        </p:nvCxnSpPr>
+        <p:spPr>
+          <a:xfrm flipH="1" flipV="1">
+            <a:off x="6470469" y="6212435"/>
+            <a:ext cx="269966" cy="517049"/>
+          </a:xfrm>
+          <a:prstGeom prst="straightConnector1">
+            <a:avLst/>
+          </a:prstGeom>
+          <a:ln>
+            <a:tailEnd type="triangle"/>
+          </a:ln>
+        </p:spPr>
+        <p:style>
+          <a:lnRef idx="1">
+            <a:schemeClr val="accent1"/>
+          </a:lnRef>
+          <a:fillRef idx="0">
+            <a:schemeClr val="accent1"/>
+          </a:fillRef>
+          <a:effectRef idx="0">
+            <a:schemeClr val="accent1"/>
+          </a:effectRef>
+          <a:fontRef idx="minor">
+            <a:schemeClr val="tx1"/>
+          </a:fontRef>
+        </p:style>
+      </p:cxnSp>
     </p:spTree>
     <p:extLst>
       <p:ext uri="{BB962C8B-B14F-4D97-AF65-F5344CB8AC3E}">
@@ -11147,11 +11180,19 @@
             <a:pPr algn="r" rtl="1"/>
             <a:r>
               <a:rPr lang="he-IL" dirty="0"/>
-              <a:t>במתודולוגיית פיתוח מונחה-בדיקות (</a:t>
+              <a:t>במתודולוגיית פיתוח מונחה-בדיקות </a:t>
+            </a:r>
+            <a:r>
+              <a:rPr lang="he-IL" dirty="0" smtClean="0"/>
+              <a:t>(</a:t>
+            </a:r>
+            <a:r>
+              <a:rPr lang="en-US" smtClean="0"/>
+              <a:t> test </a:t>
             </a:r>
             <a:r>
               <a:rPr lang="en-US" dirty="0"/>
-              <a:t>test driven development </a:t>
+              <a:t>driven development </a:t>
             </a:r>
             <a:r>
               <a:rPr lang="he-IL" dirty="0"/>
@@ -11778,11 +11819,7 @@
             </a:r>
             <a:r>
               <a:rPr lang="he-IL" dirty="0" smtClean="0"/>
-              <a:t> כיום </a:t>
-            </a:r>
-            <a:r>
-              <a:rPr lang="he-IL" dirty="0" smtClean="0"/>
-              <a:t>מפענחים את החבילה על </a:t>
+              <a:t> כיום מפענחים את החבילה על </a:t>
             </a:r>
             <a:r>
               <a:rPr lang="he-IL" dirty="0"/>
@@ -13223,11 +13260,7 @@
             <a:pPr algn="r" rtl="1"/>
             <a:r>
               <a:rPr lang="he-IL" dirty="0" smtClean="0"/>
-              <a:t>דוגמא</a:t>
-            </a:r>
-            <a:r>
-              <a:rPr lang="he-IL" dirty="0" smtClean="0"/>
-              <a:t>: </a:t>
+              <a:t>דוגמא: </a:t>
             </a:r>
             <a:r>
               <a:rPr lang="en-US" dirty="0" smtClean="0"/>
@@ -15280,7 +15313,7 @@
       </p:grpSpPr>
       <p:sp>
         <p:nvSpPr>
-          <p:cNvPr id="2" name="Title 1"/>
+          <p:cNvPr id="3" name="Title 2"/>
           <p:cNvSpPr>
             <a:spLocks noGrp="1"/>
           </p:cNvSpPr>
@@ -15295,7 +15328,7 @@
           </a:bodyPr>
           <a:lstStyle/>
           <a:p>
-            <a:pPr algn="ctr" rtl="1"/>
+            <a:pPr algn="ctr"/>
             <a:r>
               <a:rPr lang="en-US" dirty="0"/>
               <a:t/>
@@ -15311,61 +15344,3227 @@
               <a:rPr lang="en-US" dirty="0"/>
             </a:br>
             <a:r>
-              <a:rPr lang="he-IL" dirty="0" smtClean="0"/>
+              <a:rPr lang="he-IL" dirty="0"/>
               <a:t>מימוש האלגוריתם – גבול שמאלי</a:t>
             </a:r>
             <a:r>
-              <a:rPr lang="en-US" b="0" dirty="0" smtClean="0">
-                <a:effectLst/>
-              </a:rPr>
+              <a:rPr lang="en-US" dirty="0"/>
               <a:t/>
             </a:r>
             <a:br>
-              <a:rPr lang="en-US" b="0" dirty="0" smtClean="0">
-                <a:effectLst/>
-              </a:rPr>
+              <a:rPr lang="en-US" dirty="0"/>
             </a:br>
             <a:r>
-              <a:rPr lang="en-US" dirty="0" smtClean="0"/>
+              <a:rPr lang="en-US" dirty="0"/>
               <a:t/>
             </a:r>
             <a:br>
-              <a:rPr lang="en-US" dirty="0" smtClean="0"/>
+              <a:rPr lang="en-US" dirty="0"/>
             </a:br>
             <a:endParaRPr lang="en-US" dirty="0"/>
           </a:p>
         </p:txBody>
       </p:sp>
-      <p:pic>
-        <p:nvPicPr>
-          <p:cNvPr id="6" name="Content Placeholder 5"/>
-          <p:cNvPicPr>
-            <a:picLocks noGrp="1" noChangeAspect="1"/>
-          </p:cNvPicPr>
+      <p:sp>
+        <p:nvSpPr>
+          <p:cNvPr id="4" name="Content Placeholder 3"/>
+          <p:cNvSpPr>
+            <a:spLocks noGrp="1"/>
+          </p:cNvSpPr>
           <p:nvPr>
             <p:ph idx="1"/>
           </p:nvPr>
-        </p:nvPicPr>
-        <p:blipFill>
-          <a:blip r:embed="rId2"/>
-          <a:stretch>
-            <a:fillRect/>
-          </a:stretch>
-        </p:blipFill>
+        </p:nvSpPr>
+        <p:spPr/>
+        <p:txBody>
+          <a:bodyPr/>
+          <a:lstStyle/>
+          <a:p>
+            <a:endParaRPr lang="en-US"/>
+          </a:p>
+        </p:txBody>
+      </p:sp>
+      <p:sp>
+        <p:nvSpPr>
+          <p:cNvPr id="8" name="Content Placeholder 2"/>
+          <p:cNvSpPr txBox="1">
+            <a:spLocks/>
+          </p:cNvSpPr>
+          <p:nvPr/>
+        </p:nvSpPr>
         <p:spPr>
           <a:xfrm>
-            <a:off x="722812" y="1690688"/>
-            <a:ext cx="7526300" cy="4919157"/>
+            <a:off x="838200" y="1825625"/>
+            <a:ext cx="10515600" cy="4351338"/>
           </a:xfrm>
           <a:prstGeom prst="rect">
             <a:avLst/>
           </a:prstGeom>
         </p:spPr>
-      </p:pic>
+        <p:txBody>
+          <a:bodyPr vert="horz" lIns="91440" tIns="45720" rIns="91440" bIns="45720" rtlCol="0">
+            <a:normAutofit/>
+          </a:bodyPr>
+          <a:lstStyle>
+            <a:lvl1pPr marL="228600" indent="-228600" algn="l" defTabSz="914400" rtl="0" eaLnBrk="1" latinLnBrk="0" hangingPunct="1">
+              <a:lnSpc>
+                <a:spcPct val="90000"/>
+              </a:lnSpc>
+              <a:spcBef>
+                <a:spcPts val="1000"/>
+              </a:spcBef>
+              <a:buFont typeface="Arial" panose="020B0604020202020204" pitchFamily="34" charset="0"/>
+              <a:buChar char="•"/>
+              <a:defRPr sz="2800" kern="1200">
+                <a:solidFill>
+                  <a:schemeClr val="tx1"/>
+                </a:solidFill>
+                <a:latin typeface="+mn-lt"/>
+                <a:ea typeface="+mn-ea"/>
+                <a:cs typeface="+mn-cs"/>
+              </a:defRPr>
+            </a:lvl1pPr>
+            <a:lvl2pPr marL="685800" indent="-228600" algn="l" defTabSz="914400" rtl="0" eaLnBrk="1" latinLnBrk="0" hangingPunct="1">
+              <a:lnSpc>
+                <a:spcPct val="90000"/>
+              </a:lnSpc>
+              <a:spcBef>
+                <a:spcPts val="500"/>
+              </a:spcBef>
+              <a:buFont typeface="Arial" panose="020B0604020202020204" pitchFamily="34" charset="0"/>
+              <a:buChar char="•"/>
+              <a:defRPr sz="2400" kern="1200">
+                <a:solidFill>
+                  <a:schemeClr val="tx1"/>
+                </a:solidFill>
+                <a:latin typeface="+mn-lt"/>
+                <a:ea typeface="+mn-ea"/>
+                <a:cs typeface="+mn-cs"/>
+              </a:defRPr>
+            </a:lvl2pPr>
+            <a:lvl3pPr marL="1143000" indent="-228600" algn="l" defTabSz="914400" rtl="0" eaLnBrk="1" latinLnBrk="0" hangingPunct="1">
+              <a:lnSpc>
+                <a:spcPct val="90000"/>
+              </a:lnSpc>
+              <a:spcBef>
+                <a:spcPts val="500"/>
+              </a:spcBef>
+              <a:buFont typeface="Arial" panose="020B0604020202020204" pitchFamily="34" charset="0"/>
+              <a:buChar char="•"/>
+              <a:defRPr sz="2000" kern="1200">
+                <a:solidFill>
+                  <a:schemeClr val="tx1"/>
+                </a:solidFill>
+                <a:latin typeface="+mn-lt"/>
+                <a:ea typeface="+mn-ea"/>
+                <a:cs typeface="+mn-cs"/>
+              </a:defRPr>
+            </a:lvl3pPr>
+            <a:lvl4pPr marL="1600200" indent="-228600" algn="l" defTabSz="914400" rtl="0" eaLnBrk="1" latinLnBrk="0" hangingPunct="1">
+              <a:lnSpc>
+                <a:spcPct val="90000"/>
+              </a:lnSpc>
+              <a:spcBef>
+                <a:spcPts val="500"/>
+              </a:spcBef>
+              <a:buFont typeface="Arial" panose="020B0604020202020204" pitchFamily="34" charset="0"/>
+              <a:buChar char="•"/>
+              <a:defRPr sz="1800" kern="1200">
+                <a:solidFill>
+                  <a:schemeClr val="tx1"/>
+                </a:solidFill>
+                <a:latin typeface="+mn-lt"/>
+                <a:ea typeface="+mn-ea"/>
+                <a:cs typeface="+mn-cs"/>
+              </a:defRPr>
+            </a:lvl4pPr>
+            <a:lvl5pPr marL="2057400" indent="-228600" algn="l" defTabSz="914400" rtl="0" eaLnBrk="1" latinLnBrk="0" hangingPunct="1">
+              <a:lnSpc>
+                <a:spcPct val="90000"/>
+              </a:lnSpc>
+              <a:spcBef>
+                <a:spcPts val="500"/>
+              </a:spcBef>
+              <a:buFont typeface="Arial" panose="020B0604020202020204" pitchFamily="34" charset="0"/>
+              <a:buChar char="•"/>
+              <a:defRPr sz="1800" kern="1200">
+                <a:solidFill>
+                  <a:schemeClr val="tx1"/>
+                </a:solidFill>
+                <a:latin typeface="+mn-lt"/>
+                <a:ea typeface="+mn-ea"/>
+                <a:cs typeface="+mn-cs"/>
+              </a:defRPr>
+            </a:lvl5pPr>
+            <a:lvl6pPr marL="2514600" indent="-228600" algn="l" defTabSz="914400" rtl="0" eaLnBrk="1" latinLnBrk="0" hangingPunct="1">
+              <a:lnSpc>
+                <a:spcPct val="90000"/>
+              </a:lnSpc>
+              <a:spcBef>
+                <a:spcPts val="500"/>
+              </a:spcBef>
+              <a:buFont typeface="Arial" panose="020B0604020202020204" pitchFamily="34" charset="0"/>
+              <a:buChar char="•"/>
+              <a:defRPr sz="1800" kern="1200">
+                <a:solidFill>
+                  <a:schemeClr val="tx1"/>
+                </a:solidFill>
+                <a:latin typeface="+mn-lt"/>
+                <a:ea typeface="+mn-ea"/>
+                <a:cs typeface="+mn-cs"/>
+              </a:defRPr>
+            </a:lvl6pPr>
+            <a:lvl7pPr marL="2971800" indent="-228600" algn="l" defTabSz="914400" rtl="0" eaLnBrk="1" latinLnBrk="0" hangingPunct="1">
+              <a:lnSpc>
+                <a:spcPct val="90000"/>
+              </a:lnSpc>
+              <a:spcBef>
+                <a:spcPts val="500"/>
+              </a:spcBef>
+              <a:buFont typeface="Arial" panose="020B0604020202020204" pitchFamily="34" charset="0"/>
+              <a:buChar char="•"/>
+              <a:defRPr sz="1800" kern="1200">
+                <a:solidFill>
+                  <a:schemeClr val="tx1"/>
+                </a:solidFill>
+                <a:latin typeface="+mn-lt"/>
+                <a:ea typeface="+mn-ea"/>
+                <a:cs typeface="+mn-cs"/>
+              </a:defRPr>
+            </a:lvl7pPr>
+            <a:lvl8pPr marL="3429000" indent="-228600" algn="l" defTabSz="914400" rtl="0" eaLnBrk="1" latinLnBrk="0" hangingPunct="1">
+              <a:lnSpc>
+                <a:spcPct val="90000"/>
+              </a:lnSpc>
+              <a:spcBef>
+                <a:spcPts val="500"/>
+              </a:spcBef>
+              <a:buFont typeface="Arial" panose="020B0604020202020204" pitchFamily="34" charset="0"/>
+              <a:buChar char="•"/>
+              <a:defRPr sz="1800" kern="1200">
+                <a:solidFill>
+                  <a:schemeClr val="tx1"/>
+                </a:solidFill>
+                <a:latin typeface="+mn-lt"/>
+                <a:ea typeface="+mn-ea"/>
+                <a:cs typeface="+mn-cs"/>
+              </a:defRPr>
+            </a:lvl8pPr>
+            <a:lvl9pPr marL="3886200" indent="-228600" algn="l" defTabSz="914400" rtl="0" eaLnBrk="1" latinLnBrk="0" hangingPunct="1">
+              <a:lnSpc>
+                <a:spcPct val="90000"/>
+              </a:lnSpc>
+              <a:spcBef>
+                <a:spcPts val="500"/>
+              </a:spcBef>
+              <a:buFont typeface="Arial" panose="020B0604020202020204" pitchFamily="34" charset="0"/>
+              <a:buChar char="•"/>
+              <a:defRPr sz="1800" kern="1200">
+                <a:solidFill>
+                  <a:schemeClr val="tx1"/>
+                </a:solidFill>
+                <a:latin typeface="+mn-lt"/>
+                <a:ea typeface="+mn-ea"/>
+                <a:cs typeface="+mn-cs"/>
+              </a:defRPr>
+            </a:lvl9pPr>
+          </a:lstStyle>
+          <a:p>
+            <a:r>
+              <a:rPr lang="en-US" dirty="0" smtClean="0"/>
+              <a:t>Pattern set: </a:t>
+            </a:r>
+          </a:p>
+          <a:p>
+            <a:pPr lvl="1"/>
+            <a:r>
+              <a:rPr lang="en-US" dirty="0" smtClean="0"/>
+              <a:t>{“</a:t>
+            </a:r>
+            <a:r>
+              <a:rPr lang="en-US" dirty="0" err="1" smtClean="0"/>
+              <a:t>abcdef</a:t>
+            </a:r>
+            <a:r>
+              <a:rPr lang="en-US" dirty="0" smtClean="0"/>
+              <a:t>”} </a:t>
+            </a:r>
+          </a:p>
+          <a:p>
+            <a:r>
+              <a:rPr lang="en-US" dirty="0" smtClean="0"/>
+              <a:t>W = 3</a:t>
+            </a:r>
+          </a:p>
+          <a:p>
+            <a:r>
+              <a:rPr lang="en-US" dirty="0" smtClean="0"/>
+              <a:t>Input: </a:t>
+            </a:r>
+            <a:r>
+              <a:rPr lang="en-US" dirty="0" err="1" smtClean="0"/>
+              <a:t>bcdefa</a:t>
+            </a:r>
+            <a:r>
+              <a:rPr lang="en-US" dirty="0" smtClean="0"/>
+              <a:t>{6,5}</a:t>
+            </a:r>
+          </a:p>
+          <a:p>
+            <a:pPr marL="457200" lvl="1" indent="0">
+              <a:buFont typeface="Arial" panose="020B0604020202020204" pitchFamily="34" charset="0"/>
+              <a:buNone/>
+            </a:pPr>
+            <a:r>
+              <a:rPr lang="en-US" dirty="0" smtClean="0"/>
+              <a:t>	                   </a:t>
+            </a:r>
+            <a:r>
+              <a:rPr lang="en-US" dirty="0" err="1" smtClean="0"/>
+              <a:t>bcdef</a:t>
+            </a:r>
+            <a:r>
+              <a:rPr lang="en-US" dirty="0" smtClean="0"/>
+              <a:t/>
+            </a:r>
+            <a:br>
+              <a:rPr lang="en-US" dirty="0" smtClean="0"/>
+            </a:br>
+            <a:endParaRPr lang="en-US" dirty="0" smtClean="0"/>
+          </a:p>
+        </p:txBody>
+      </p:sp>
+      <p:sp>
+        <p:nvSpPr>
+          <p:cNvPr id="9" name="Rectangle 8"/>
+          <p:cNvSpPr/>
+          <p:nvPr/>
+        </p:nvSpPr>
+        <p:spPr>
+          <a:xfrm>
+            <a:off x="652794" y="4926600"/>
+            <a:ext cx="4454610" cy="420130"/>
+          </a:xfrm>
+          <a:prstGeom prst="rect">
+            <a:avLst/>
+          </a:prstGeom>
+        </p:spPr>
+        <p:style>
+          <a:lnRef idx="2">
+            <a:schemeClr val="accent1">
+              <a:shade val="50000"/>
+            </a:schemeClr>
+          </a:lnRef>
+          <a:fillRef idx="1">
+            <a:schemeClr val="accent1"/>
+          </a:fillRef>
+          <a:effectRef idx="0">
+            <a:schemeClr val="accent1"/>
+          </a:effectRef>
+          <a:fontRef idx="minor">
+            <a:schemeClr val="lt1"/>
+          </a:fontRef>
+        </p:style>
+        <p:txBody>
+          <a:bodyPr rtlCol="0" anchor="ctr"/>
+          <a:lstStyle/>
+          <a:p>
+            <a:pPr algn="ctr"/>
+            <a:r>
+              <a:rPr lang="en-US" dirty="0" smtClean="0"/>
+              <a:t>SPMB</a:t>
+            </a:r>
+            <a:endParaRPr lang="en-US" dirty="0"/>
+          </a:p>
+        </p:txBody>
+      </p:sp>
+      <p:sp>
+        <p:nvSpPr>
+          <p:cNvPr id="10" name="Rectangle 9"/>
+          <p:cNvSpPr/>
+          <p:nvPr/>
+        </p:nvSpPr>
+        <p:spPr>
+          <a:xfrm>
+            <a:off x="652793" y="5363206"/>
+            <a:ext cx="405714" cy="313037"/>
+          </a:xfrm>
+          <a:prstGeom prst="rect">
+            <a:avLst/>
+          </a:prstGeom>
+        </p:spPr>
+        <p:style>
+          <a:lnRef idx="2">
+            <a:schemeClr val="accent1">
+              <a:shade val="50000"/>
+            </a:schemeClr>
+          </a:lnRef>
+          <a:fillRef idx="1">
+            <a:schemeClr val="accent1"/>
+          </a:fillRef>
+          <a:effectRef idx="0">
+            <a:schemeClr val="accent1"/>
+          </a:effectRef>
+          <a:fontRef idx="minor">
+            <a:schemeClr val="lt1"/>
+          </a:fontRef>
+        </p:style>
+        <p:txBody>
+          <a:bodyPr rtlCol="0" anchor="ctr"/>
+          <a:lstStyle/>
+          <a:p>
+            <a:pPr algn="ctr"/>
+            <a:r>
+              <a:rPr lang="en-US" dirty="0"/>
+              <a:t>0</a:t>
+            </a:r>
+          </a:p>
+        </p:txBody>
+      </p:sp>
+      <p:sp>
+        <p:nvSpPr>
+          <p:cNvPr id="11" name="Rectangle 10"/>
+          <p:cNvSpPr/>
+          <p:nvPr/>
+        </p:nvSpPr>
+        <p:spPr>
+          <a:xfrm>
+            <a:off x="652793" y="5692719"/>
+            <a:ext cx="405714" cy="313037"/>
+          </a:xfrm>
+          <a:prstGeom prst="rect">
+            <a:avLst/>
+          </a:prstGeom>
+        </p:spPr>
+        <p:style>
+          <a:lnRef idx="2">
+            <a:schemeClr val="accent1">
+              <a:shade val="50000"/>
+            </a:schemeClr>
+          </a:lnRef>
+          <a:fillRef idx="1">
+            <a:schemeClr val="accent1"/>
+          </a:fillRef>
+          <a:effectRef idx="0">
+            <a:schemeClr val="accent1"/>
+          </a:effectRef>
+          <a:fontRef idx="minor">
+            <a:schemeClr val="lt1"/>
+          </a:fontRef>
+        </p:style>
+        <p:txBody>
+          <a:bodyPr rtlCol="0" anchor="ctr"/>
+          <a:lstStyle/>
+          <a:p>
+            <a:pPr algn="ctr"/>
+            <a:r>
+              <a:rPr lang="en-US" dirty="0" smtClean="0"/>
+              <a:t>0</a:t>
+            </a:r>
+            <a:endParaRPr lang="en-US" dirty="0"/>
+          </a:p>
+        </p:txBody>
+      </p:sp>
+      <p:sp>
+        <p:nvSpPr>
+          <p:cNvPr id="12" name="Rectangle 11"/>
+          <p:cNvSpPr/>
+          <p:nvPr/>
+        </p:nvSpPr>
+        <p:spPr>
+          <a:xfrm>
+            <a:off x="1057477" y="5363206"/>
+            <a:ext cx="405714" cy="313037"/>
+          </a:xfrm>
+          <a:prstGeom prst="rect">
+            <a:avLst/>
+          </a:prstGeom>
+        </p:spPr>
+        <p:style>
+          <a:lnRef idx="2">
+            <a:schemeClr val="accent1">
+              <a:shade val="50000"/>
+            </a:schemeClr>
+          </a:lnRef>
+          <a:fillRef idx="1">
+            <a:schemeClr val="accent1"/>
+          </a:fillRef>
+          <a:effectRef idx="0">
+            <a:schemeClr val="accent1"/>
+          </a:effectRef>
+          <a:fontRef idx="minor">
+            <a:schemeClr val="lt1"/>
+          </a:fontRef>
+        </p:style>
+        <p:txBody>
+          <a:bodyPr rtlCol="0" anchor="ctr"/>
+          <a:lstStyle/>
+          <a:p>
+            <a:pPr algn="ctr"/>
+            <a:r>
+              <a:rPr lang="en-US" dirty="0"/>
+              <a:t>1</a:t>
+            </a:r>
+          </a:p>
+        </p:txBody>
+      </p:sp>
+      <p:sp>
+        <p:nvSpPr>
+          <p:cNvPr id="13" name="Rectangle 12"/>
+          <p:cNvSpPr/>
+          <p:nvPr/>
+        </p:nvSpPr>
+        <p:spPr>
+          <a:xfrm>
+            <a:off x="1057477" y="5692719"/>
+            <a:ext cx="405714" cy="313037"/>
+          </a:xfrm>
+          <a:prstGeom prst="rect">
+            <a:avLst/>
+          </a:prstGeom>
+        </p:spPr>
+        <p:style>
+          <a:lnRef idx="2">
+            <a:schemeClr val="accent1">
+              <a:shade val="50000"/>
+            </a:schemeClr>
+          </a:lnRef>
+          <a:fillRef idx="1">
+            <a:schemeClr val="accent1"/>
+          </a:fillRef>
+          <a:effectRef idx="0">
+            <a:schemeClr val="accent1"/>
+          </a:effectRef>
+          <a:fontRef idx="minor">
+            <a:schemeClr val="lt1"/>
+          </a:fontRef>
+        </p:style>
+        <p:txBody>
+          <a:bodyPr rtlCol="0" anchor="ctr"/>
+          <a:lstStyle/>
+          <a:p>
+            <a:pPr algn="ctr"/>
+            <a:r>
+              <a:rPr lang="en-US" dirty="0" smtClean="0"/>
+              <a:t>0</a:t>
+            </a:r>
+            <a:endParaRPr lang="en-US" dirty="0"/>
+          </a:p>
+        </p:txBody>
+      </p:sp>
+      <p:sp>
+        <p:nvSpPr>
+          <p:cNvPr id="14" name="Rectangle 13"/>
+          <p:cNvSpPr/>
+          <p:nvPr/>
+        </p:nvSpPr>
+        <p:spPr>
+          <a:xfrm>
+            <a:off x="1462160" y="5363206"/>
+            <a:ext cx="405714" cy="313037"/>
+          </a:xfrm>
+          <a:prstGeom prst="rect">
+            <a:avLst/>
+          </a:prstGeom>
+        </p:spPr>
+        <p:style>
+          <a:lnRef idx="2">
+            <a:schemeClr val="accent1">
+              <a:shade val="50000"/>
+            </a:schemeClr>
+          </a:lnRef>
+          <a:fillRef idx="1">
+            <a:schemeClr val="accent1"/>
+          </a:fillRef>
+          <a:effectRef idx="0">
+            <a:schemeClr val="accent1"/>
+          </a:effectRef>
+          <a:fontRef idx="minor">
+            <a:schemeClr val="lt1"/>
+          </a:fontRef>
+        </p:style>
+        <p:txBody>
+          <a:bodyPr rtlCol="0" anchor="ctr"/>
+          <a:lstStyle/>
+          <a:p>
+            <a:pPr algn="ctr"/>
+            <a:r>
+              <a:rPr lang="en-US" dirty="0"/>
+              <a:t>2</a:t>
+            </a:r>
+          </a:p>
+        </p:txBody>
+      </p:sp>
+      <p:sp>
+        <p:nvSpPr>
+          <p:cNvPr id="15" name="Rectangle 14"/>
+          <p:cNvSpPr/>
+          <p:nvPr/>
+        </p:nvSpPr>
+        <p:spPr>
+          <a:xfrm>
+            <a:off x="1462160" y="5692719"/>
+            <a:ext cx="405714" cy="313037"/>
+          </a:xfrm>
+          <a:prstGeom prst="rect">
+            <a:avLst/>
+          </a:prstGeom>
+        </p:spPr>
+        <p:style>
+          <a:lnRef idx="2">
+            <a:schemeClr val="accent1">
+              <a:shade val="50000"/>
+            </a:schemeClr>
+          </a:lnRef>
+          <a:fillRef idx="1">
+            <a:schemeClr val="accent1"/>
+          </a:fillRef>
+          <a:effectRef idx="0">
+            <a:schemeClr val="accent1"/>
+          </a:effectRef>
+          <a:fontRef idx="minor">
+            <a:schemeClr val="lt1"/>
+          </a:fontRef>
+        </p:style>
+        <p:txBody>
+          <a:bodyPr rtlCol="0" anchor="ctr"/>
+          <a:lstStyle/>
+          <a:p>
+            <a:pPr algn="ctr"/>
+            <a:r>
+              <a:rPr lang="en-US" dirty="0" smtClean="0"/>
+              <a:t>0</a:t>
+            </a:r>
+            <a:endParaRPr lang="en-US" dirty="0"/>
+          </a:p>
+        </p:txBody>
+      </p:sp>
+      <p:sp>
+        <p:nvSpPr>
+          <p:cNvPr id="16" name="Rectangle 15"/>
+          <p:cNvSpPr/>
+          <p:nvPr/>
+        </p:nvSpPr>
+        <p:spPr>
+          <a:xfrm>
+            <a:off x="1867874" y="5363206"/>
+            <a:ext cx="405714" cy="313037"/>
+          </a:xfrm>
+          <a:prstGeom prst="rect">
+            <a:avLst/>
+          </a:prstGeom>
+        </p:spPr>
+        <p:style>
+          <a:lnRef idx="2">
+            <a:schemeClr val="accent1">
+              <a:shade val="50000"/>
+            </a:schemeClr>
+          </a:lnRef>
+          <a:fillRef idx="1">
+            <a:schemeClr val="accent1"/>
+          </a:fillRef>
+          <a:effectRef idx="0">
+            <a:schemeClr val="accent1"/>
+          </a:effectRef>
+          <a:fontRef idx="minor">
+            <a:schemeClr val="lt1"/>
+          </a:fontRef>
+        </p:style>
+        <p:txBody>
+          <a:bodyPr rtlCol="0" anchor="ctr"/>
+          <a:lstStyle/>
+          <a:p>
+            <a:pPr algn="ctr"/>
+            <a:r>
+              <a:rPr lang="en-US" dirty="0"/>
+              <a:t>3</a:t>
+            </a:r>
+          </a:p>
+        </p:txBody>
+      </p:sp>
+      <p:sp>
+        <p:nvSpPr>
+          <p:cNvPr id="17" name="Rectangle 16"/>
+          <p:cNvSpPr/>
+          <p:nvPr/>
+        </p:nvSpPr>
+        <p:spPr>
+          <a:xfrm>
+            <a:off x="2272558" y="5363206"/>
+            <a:ext cx="405714" cy="313037"/>
+          </a:xfrm>
+          <a:prstGeom prst="rect">
+            <a:avLst/>
+          </a:prstGeom>
+        </p:spPr>
+        <p:style>
+          <a:lnRef idx="2">
+            <a:schemeClr val="accent1">
+              <a:shade val="50000"/>
+            </a:schemeClr>
+          </a:lnRef>
+          <a:fillRef idx="1">
+            <a:schemeClr val="accent1"/>
+          </a:fillRef>
+          <a:effectRef idx="0">
+            <a:schemeClr val="accent1"/>
+          </a:effectRef>
+          <a:fontRef idx="minor">
+            <a:schemeClr val="lt1"/>
+          </a:fontRef>
+        </p:style>
+        <p:txBody>
+          <a:bodyPr rtlCol="0" anchor="ctr"/>
+          <a:lstStyle/>
+          <a:p>
+            <a:pPr algn="ctr"/>
+            <a:r>
+              <a:rPr lang="en-US" dirty="0"/>
+              <a:t>4</a:t>
+            </a:r>
+          </a:p>
+        </p:txBody>
+      </p:sp>
+      <p:sp>
+        <p:nvSpPr>
+          <p:cNvPr id="18" name="Rectangle 17"/>
+          <p:cNvSpPr/>
+          <p:nvPr/>
+        </p:nvSpPr>
+        <p:spPr>
+          <a:xfrm>
+            <a:off x="2272558" y="5692719"/>
+            <a:ext cx="405714" cy="313037"/>
+          </a:xfrm>
+          <a:prstGeom prst="rect">
+            <a:avLst/>
+          </a:prstGeom>
+        </p:spPr>
+        <p:style>
+          <a:lnRef idx="2">
+            <a:schemeClr val="accent1">
+              <a:shade val="50000"/>
+            </a:schemeClr>
+          </a:lnRef>
+          <a:fillRef idx="1">
+            <a:schemeClr val="accent1"/>
+          </a:fillRef>
+          <a:effectRef idx="0">
+            <a:schemeClr val="accent1"/>
+          </a:effectRef>
+          <a:fontRef idx="minor">
+            <a:schemeClr val="lt1"/>
+          </a:fontRef>
+        </p:style>
+        <p:txBody>
+          <a:bodyPr rtlCol="0" anchor="ctr"/>
+          <a:lstStyle/>
+          <a:p>
+            <a:pPr algn="ctr"/>
+            <a:r>
+              <a:rPr lang="en-US" dirty="0" smtClean="0"/>
+              <a:t>1</a:t>
+            </a:r>
+            <a:endParaRPr lang="en-US" dirty="0"/>
+          </a:p>
+        </p:txBody>
+      </p:sp>
+      <p:sp>
+        <p:nvSpPr>
+          <p:cNvPr id="19" name="Rectangle 18"/>
+          <p:cNvSpPr/>
+          <p:nvPr/>
+        </p:nvSpPr>
+        <p:spPr>
+          <a:xfrm>
+            <a:off x="2677241" y="5363206"/>
+            <a:ext cx="405714" cy="313037"/>
+          </a:xfrm>
+          <a:prstGeom prst="rect">
+            <a:avLst/>
+          </a:prstGeom>
+        </p:spPr>
+        <p:style>
+          <a:lnRef idx="2">
+            <a:schemeClr val="accent1">
+              <a:shade val="50000"/>
+            </a:schemeClr>
+          </a:lnRef>
+          <a:fillRef idx="1">
+            <a:schemeClr val="accent1"/>
+          </a:fillRef>
+          <a:effectRef idx="0">
+            <a:schemeClr val="accent1"/>
+          </a:effectRef>
+          <a:fontRef idx="minor">
+            <a:schemeClr val="lt1"/>
+          </a:fontRef>
+        </p:style>
+        <p:txBody>
+          <a:bodyPr rtlCol="0" anchor="ctr"/>
+          <a:lstStyle/>
+          <a:p>
+            <a:pPr algn="ctr"/>
+            <a:r>
+              <a:rPr lang="en-US" dirty="0"/>
+              <a:t>5</a:t>
+            </a:r>
+          </a:p>
+        </p:txBody>
+      </p:sp>
+      <p:sp>
+        <p:nvSpPr>
+          <p:cNvPr id="20" name="Rectangle 19"/>
+          <p:cNvSpPr/>
+          <p:nvPr/>
+        </p:nvSpPr>
+        <p:spPr>
+          <a:xfrm>
+            <a:off x="2677241" y="5692719"/>
+            <a:ext cx="402623" cy="313037"/>
+          </a:xfrm>
+          <a:prstGeom prst="rect">
+            <a:avLst/>
+          </a:prstGeom>
+        </p:spPr>
+        <p:style>
+          <a:lnRef idx="2">
+            <a:schemeClr val="accent1">
+              <a:shade val="50000"/>
+            </a:schemeClr>
+          </a:lnRef>
+          <a:fillRef idx="1">
+            <a:schemeClr val="accent1"/>
+          </a:fillRef>
+          <a:effectRef idx="0">
+            <a:schemeClr val="accent1"/>
+          </a:effectRef>
+          <a:fontRef idx="minor">
+            <a:schemeClr val="lt1"/>
+          </a:fontRef>
+        </p:style>
+        <p:txBody>
+          <a:bodyPr rtlCol="0" anchor="ctr"/>
+          <a:lstStyle/>
+          <a:p>
+            <a:pPr algn="ctr"/>
+            <a:endParaRPr lang="en-US" dirty="0"/>
+          </a:p>
+        </p:txBody>
+      </p:sp>
+      <p:sp>
+        <p:nvSpPr>
+          <p:cNvPr id="21" name="Rectangle 20"/>
+          <p:cNvSpPr/>
+          <p:nvPr/>
+        </p:nvSpPr>
+        <p:spPr>
+          <a:xfrm>
+            <a:off x="3082955" y="5363206"/>
+            <a:ext cx="405714" cy="313037"/>
+          </a:xfrm>
+          <a:prstGeom prst="rect">
+            <a:avLst/>
+          </a:prstGeom>
+        </p:spPr>
+        <p:style>
+          <a:lnRef idx="2">
+            <a:schemeClr val="accent1">
+              <a:shade val="50000"/>
+            </a:schemeClr>
+          </a:lnRef>
+          <a:fillRef idx="1">
+            <a:schemeClr val="accent1"/>
+          </a:fillRef>
+          <a:effectRef idx="0">
+            <a:schemeClr val="accent1"/>
+          </a:effectRef>
+          <a:fontRef idx="minor">
+            <a:schemeClr val="lt1"/>
+          </a:fontRef>
+        </p:style>
+        <p:txBody>
+          <a:bodyPr rtlCol="0" anchor="ctr"/>
+          <a:lstStyle/>
+          <a:p>
+            <a:pPr algn="ctr"/>
+            <a:r>
+              <a:rPr lang="en-US" dirty="0"/>
+              <a:t>6</a:t>
+            </a:r>
+          </a:p>
+        </p:txBody>
+      </p:sp>
+      <p:sp>
+        <p:nvSpPr>
+          <p:cNvPr id="22" name="Rectangle 21"/>
+          <p:cNvSpPr/>
+          <p:nvPr/>
+        </p:nvSpPr>
+        <p:spPr>
+          <a:xfrm>
+            <a:off x="3082955" y="5692719"/>
+            <a:ext cx="405714" cy="313037"/>
+          </a:xfrm>
+          <a:prstGeom prst="rect">
+            <a:avLst/>
+          </a:prstGeom>
+        </p:spPr>
+        <p:style>
+          <a:lnRef idx="2">
+            <a:schemeClr val="accent1">
+              <a:shade val="50000"/>
+            </a:schemeClr>
+          </a:lnRef>
+          <a:fillRef idx="1">
+            <a:schemeClr val="accent1"/>
+          </a:fillRef>
+          <a:effectRef idx="0">
+            <a:schemeClr val="accent1"/>
+          </a:effectRef>
+          <a:fontRef idx="minor">
+            <a:schemeClr val="lt1"/>
+          </a:fontRef>
+        </p:style>
+        <p:txBody>
+          <a:bodyPr rtlCol="0" anchor="ctr"/>
+          <a:lstStyle/>
+          <a:p>
+            <a:pPr algn="ctr"/>
+            <a:endParaRPr lang="en-US" dirty="0"/>
+          </a:p>
+        </p:txBody>
+      </p:sp>
+      <p:sp>
+        <p:nvSpPr>
+          <p:cNvPr id="23" name="Rectangle 22"/>
+          <p:cNvSpPr/>
+          <p:nvPr/>
+        </p:nvSpPr>
+        <p:spPr>
+          <a:xfrm>
+            <a:off x="3487639" y="5363206"/>
+            <a:ext cx="405714" cy="313037"/>
+          </a:xfrm>
+          <a:prstGeom prst="rect">
+            <a:avLst/>
+          </a:prstGeom>
+        </p:spPr>
+        <p:style>
+          <a:lnRef idx="2">
+            <a:schemeClr val="accent1">
+              <a:shade val="50000"/>
+            </a:schemeClr>
+          </a:lnRef>
+          <a:fillRef idx="1">
+            <a:schemeClr val="accent1"/>
+          </a:fillRef>
+          <a:effectRef idx="0">
+            <a:schemeClr val="accent1"/>
+          </a:effectRef>
+          <a:fontRef idx="minor">
+            <a:schemeClr val="lt1"/>
+          </a:fontRef>
+        </p:style>
+        <p:txBody>
+          <a:bodyPr rtlCol="0" anchor="ctr"/>
+          <a:lstStyle/>
+          <a:p>
+            <a:pPr algn="ctr"/>
+            <a:r>
+              <a:rPr lang="en-US" dirty="0"/>
+              <a:t>7</a:t>
+            </a:r>
+          </a:p>
+        </p:txBody>
+      </p:sp>
+      <p:sp>
+        <p:nvSpPr>
+          <p:cNvPr id="24" name="Rectangle 23"/>
+          <p:cNvSpPr/>
+          <p:nvPr/>
+        </p:nvSpPr>
+        <p:spPr>
+          <a:xfrm>
+            <a:off x="3892322" y="5363206"/>
+            <a:ext cx="405714" cy="313037"/>
+          </a:xfrm>
+          <a:prstGeom prst="rect">
+            <a:avLst/>
+          </a:prstGeom>
+        </p:spPr>
+        <p:style>
+          <a:lnRef idx="2">
+            <a:schemeClr val="accent1">
+              <a:shade val="50000"/>
+            </a:schemeClr>
+          </a:lnRef>
+          <a:fillRef idx="1">
+            <a:schemeClr val="accent1"/>
+          </a:fillRef>
+          <a:effectRef idx="0">
+            <a:schemeClr val="accent1"/>
+          </a:effectRef>
+          <a:fontRef idx="minor">
+            <a:schemeClr val="lt1"/>
+          </a:fontRef>
+        </p:style>
+        <p:txBody>
+          <a:bodyPr rtlCol="0" anchor="ctr"/>
+          <a:lstStyle/>
+          <a:p>
+            <a:pPr algn="ctr"/>
+            <a:r>
+              <a:rPr lang="en-US" dirty="0"/>
+              <a:t>8</a:t>
+            </a:r>
+          </a:p>
+        </p:txBody>
+      </p:sp>
+      <p:sp>
+        <p:nvSpPr>
+          <p:cNvPr id="25" name="Rectangle 24"/>
+          <p:cNvSpPr/>
+          <p:nvPr/>
+        </p:nvSpPr>
+        <p:spPr>
+          <a:xfrm>
+            <a:off x="3892322" y="5692719"/>
+            <a:ext cx="405714" cy="313037"/>
+          </a:xfrm>
+          <a:prstGeom prst="rect">
+            <a:avLst/>
+          </a:prstGeom>
+        </p:spPr>
+        <p:style>
+          <a:lnRef idx="2">
+            <a:schemeClr val="accent1">
+              <a:shade val="50000"/>
+            </a:schemeClr>
+          </a:lnRef>
+          <a:fillRef idx="1">
+            <a:schemeClr val="accent1"/>
+          </a:fillRef>
+          <a:effectRef idx="0">
+            <a:schemeClr val="accent1"/>
+          </a:effectRef>
+          <a:fontRef idx="minor">
+            <a:schemeClr val="lt1"/>
+          </a:fontRef>
+        </p:style>
+        <p:txBody>
+          <a:bodyPr rtlCol="0" anchor="ctr"/>
+          <a:lstStyle/>
+          <a:p>
+            <a:pPr algn="ctr"/>
+            <a:endParaRPr lang="en-US" dirty="0"/>
+          </a:p>
+        </p:txBody>
+      </p:sp>
+      <p:sp>
+        <p:nvSpPr>
+          <p:cNvPr id="26" name="Rectangle 25"/>
+          <p:cNvSpPr/>
+          <p:nvPr/>
+        </p:nvSpPr>
+        <p:spPr>
+          <a:xfrm>
+            <a:off x="4297006" y="5363206"/>
+            <a:ext cx="405714" cy="313037"/>
+          </a:xfrm>
+          <a:prstGeom prst="rect">
+            <a:avLst/>
+          </a:prstGeom>
+        </p:spPr>
+        <p:style>
+          <a:lnRef idx="2">
+            <a:schemeClr val="accent1">
+              <a:shade val="50000"/>
+            </a:schemeClr>
+          </a:lnRef>
+          <a:fillRef idx="1">
+            <a:schemeClr val="accent1"/>
+          </a:fillRef>
+          <a:effectRef idx="0">
+            <a:schemeClr val="accent1"/>
+          </a:effectRef>
+          <a:fontRef idx="minor">
+            <a:schemeClr val="lt1"/>
+          </a:fontRef>
+        </p:style>
+        <p:txBody>
+          <a:bodyPr rtlCol="0" anchor="ctr"/>
+          <a:lstStyle/>
+          <a:p>
+            <a:pPr algn="ctr"/>
+            <a:r>
+              <a:rPr lang="en-US" dirty="0"/>
+              <a:t>9</a:t>
+            </a:r>
+          </a:p>
+        </p:txBody>
+      </p:sp>
+      <p:sp>
+        <p:nvSpPr>
+          <p:cNvPr id="27" name="Rectangle 26"/>
+          <p:cNvSpPr/>
+          <p:nvPr/>
+        </p:nvSpPr>
+        <p:spPr>
+          <a:xfrm>
+            <a:off x="4297006" y="5692719"/>
+            <a:ext cx="405714" cy="313037"/>
+          </a:xfrm>
+          <a:prstGeom prst="rect">
+            <a:avLst/>
+          </a:prstGeom>
+        </p:spPr>
+        <p:style>
+          <a:lnRef idx="2">
+            <a:schemeClr val="accent1">
+              <a:shade val="50000"/>
+            </a:schemeClr>
+          </a:lnRef>
+          <a:fillRef idx="1">
+            <a:schemeClr val="accent1"/>
+          </a:fillRef>
+          <a:effectRef idx="0">
+            <a:schemeClr val="accent1"/>
+          </a:effectRef>
+          <a:fontRef idx="minor">
+            <a:schemeClr val="lt1"/>
+          </a:fontRef>
+        </p:style>
+        <p:txBody>
+          <a:bodyPr rtlCol="0" anchor="ctr"/>
+          <a:lstStyle/>
+          <a:p>
+            <a:pPr algn="ctr"/>
+            <a:endParaRPr lang="en-US" dirty="0"/>
+          </a:p>
+        </p:txBody>
+      </p:sp>
+      <p:sp>
+        <p:nvSpPr>
+          <p:cNvPr id="28" name="Rectangle 27"/>
+          <p:cNvSpPr/>
+          <p:nvPr/>
+        </p:nvSpPr>
+        <p:spPr>
+          <a:xfrm>
+            <a:off x="4701690" y="5363206"/>
+            <a:ext cx="405714" cy="313037"/>
+          </a:xfrm>
+          <a:prstGeom prst="rect">
+            <a:avLst/>
+          </a:prstGeom>
+        </p:spPr>
+        <p:style>
+          <a:lnRef idx="2">
+            <a:schemeClr val="accent1">
+              <a:shade val="50000"/>
+            </a:schemeClr>
+          </a:lnRef>
+          <a:fillRef idx="1">
+            <a:schemeClr val="accent1"/>
+          </a:fillRef>
+          <a:effectRef idx="0">
+            <a:schemeClr val="accent1"/>
+          </a:effectRef>
+          <a:fontRef idx="minor">
+            <a:schemeClr val="lt1"/>
+          </a:fontRef>
+        </p:style>
+        <p:txBody>
+          <a:bodyPr rtlCol="0" anchor="ctr"/>
+          <a:lstStyle/>
+          <a:p>
+            <a:pPr algn="ctr"/>
+            <a:r>
+              <a:rPr lang="en-US" sz="1600" dirty="0"/>
+              <a:t>10</a:t>
+            </a:r>
+          </a:p>
+        </p:txBody>
+      </p:sp>
+      <p:sp>
+        <p:nvSpPr>
+          <p:cNvPr id="29" name="Rectangle 28"/>
+          <p:cNvSpPr/>
+          <p:nvPr/>
+        </p:nvSpPr>
+        <p:spPr>
+          <a:xfrm>
+            <a:off x="1861701" y="5692718"/>
+            <a:ext cx="405714" cy="313037"/>
+          </a:xfrm>
+          <a:prstGeom prst="rect">
+            <a:avLst/>
+          </a:prstGeom>
+        </p:spPr>
+        <p:style>
+          <a:lnRef idx="2">
+            <a:schemeClr val="accent1">
+              <a:shade val="50000"/>
+            </a:schemeClr>
+          </a:lnRef>
+          <a:fillRef idx="1">
+            <a:schemeClr val="accent1"/>
+          </a:fillRef>
+          <a:effectRef idx="0">
+            <a:schemeClr val="accent1"/>
+          </a:effectRef>
+          <a:fontRef idx="minor">
+            <a:schemeClr val="lt1"/>
+          </a:fontRef>
+        </p:style>
+        <p:txBody>
+          <a:bodyPr rtlCol="0" anchor="ctr"/>
+          <a:lstStyle/>
+          <a:p>
+            <a:pPr algn="ctr"/>
+            <a:r>
+              <a:rPr lang="en-US" dirty="0" smtClean="0"/>
+              <a:t>0</a:t>
+            </a:r>
+            <a:endParaRPr lang="en-US" dirty="0"/>
+          </a:p>
+        </p:txBody>
+      </p:sp>
+      <p:sp>
+        <p:nvSpPr>
+          <p:cNvPr id="30" name="Rectangle 29"/>
+          <p:cNvSpPr/>
+          <p:nvPr/>
+        </p:nvSpPr>
+        <p:spPr>
+          <a:xfrm>
+            <a:off x="3502697" y="5684439"/>
+            <a:ext cx="405714" cy="313037"/>
+          </a:xfrm>
+          <a:prstGeom prst="rect">
+            <a:avLst/>
+          </a:prstGeom>
+        </p:spPr>
+        <p:style>
+          <a:lnRef idx="2">
+            <a:schemeClr val="accent1">
+              <a:shade val="50000"/>
+            </a:schemeClr>
+          </a:lnRef>
+          <a:fillRef idx="1">
+            <a:schemeClr val="accent1"/>
+          </a:fillRef>
+          <a:effectRef idx="0">
+            <a:schemeClr val="accent1"/>
+          </a:effectRef>
+          <a:fontRef idx="minor">
+            <a:schemeClr val="lt1"/>
+          </a:fontRef>
+        </p:style>
+        <p:txBody>
+          <a:bodyPr rtlCol="0" anchor="ctr"/>
+          <a:lstStyle/>
+          <a:p>
+            <a:pPr algn="ctr"/>
+            <a:endParaRPr lang="en-US" dirty="0"/>
+          </a:p>
+        </p:txBody>
+      </p:sp>
+      <p:sp>
+        <p:nvSpPr>
+          <p:cNvPr id="31" name="Rectangle 30"/>
+          <p:cNvSpPr/>
+          <p:nvPr/>
+        </p:nvSpPr>
+        <p:spPr>
+          <a:xfrm>
+            <a:off x="4712635" y="5684439"/>
+            <a:ext cx="405714" cy="313037"/>
+          </a:xfrm>
+          <a:prstGeom prst="rect">
+            <a:avLst/>
+          </a:prstGeom>
+        </p:spPr>
+        <p:style>
+          <a:lnRef idx="2">
+            <a:schemeClr val="accent1">
+              <a:shade val="50000"/>
+            </a:schemeClr>
+          </a:lnRef>
+          <a:fillRef idx="1">
+            <a:schemeClr val="accent1"/>
+          </a:fillRef>
+          <a:effectRef idx="0">
+            <a:schemeClr val="accent1"/>
+          </a:effectRef>
+          <a:fontRef idx="minor">
+            <a:schemeClr val="lt1"/>
+          </a:fontRef>
+        </p:style>
+        <p:txBody>
+          <a:bodyPr rtlCol="0" anchor="ctr"/>
+          <a:lstStyle/>
+          <a:p>
+            <a:pPr algn="ctr"/>
+            <a:endParaRPr lang="en-US" dirty="0"/>
+          </a:p>
+        </p:txBody>
+      </p:sp>
+      <p:sp>
+        <p:nvSpPr>
+          <p:cNvPr id="32" name="Rectangle 31"/>
+          <p:cNvSpPr/>
+          <p:nvPr/>
+        </p:nvSpPr>
+        <p:spPr>
+          <a:xfrm>
+            <a:off x="2878552" y="3314573"/>
+            <a:ext cx="609087" cy="705395"/>
+          </a:xfrm>
+          <a:prstGeom prst="rect">
+            <a:avLst/>
+          </a:prstGeom>
+          <a:noFill/>
+          <a:ln>
+            <a:solidFill>
+              <a:srgbClr val="FF0000"/>
+            </a:solidFill>
+          </a:ln>
+        </p:spPr>
+        <p:style>
+          <a:lnRef idx="2">
+            <a:schemeClr val="accent1">
+              <a:shade val="50000"/>
+            </a:schemeClr>
+          </a:lnRef>
+          <a:fillRef idx="1">
+            <a:schemeClr val="accent1"/>
+          </a:fillRef>
+          <a:effectRef idx="0">
+            <a:schemeClr val="accent1"/>
+          </a:effectRef>
+          <a:fontRef idx="minor">
+            <a:schemeClr val="lt1"/>
+          </a:fontRef>
+        </p:style>
+        <p:txBody>
+          <a:bodyPr rtlCol="0" anchor="ctr"/>
+          <a:lstStyle/>
+          <a:p>
+            <a:pPr algn="ctr"/>
+            <a:endParaRPr lang="en-US"/>
+          </a:p>
+        </p:txBody>
+      </p:sp>
+      <p:sp>
+        <p:nvSpPr>
+          <p:cNvPr id="33" name="Rounded Rectangle 32"/>
+          <p:cNvSpPr/>
+          <p:nvPr/>
+        </p:nvSpPr>
+        <p:spPr>
+          <a:xfrm>
+            <a:off x="4499863" y="2908663"/>
+            <a:ext cx="4955587" cy="1517217"/>
+          </a:xfrm>
+          <a:prstGeom prst="roundRect">
+            <a:avLst/>
+          </a:prstGeom>
+        </p:spPr>
+        <p:style>
+          <a:lnRef idx="2">
+            <a:schemeClr val="accent1">
+              <a:shade val="50000"/>
+            </a:schemeClr>
+          </a:lnRef>
+          <a:fillRef idx="1">
+            <a:schemeClr val="accent1"/>
+          </a:fillRef>
+          <a:effectRef idx="0">
+            <a:schemeClr val="accent1"/>
+          </a:effectRef>
+          <a:fontRef idx="minor">
+            <a:schemeClr val="lt1"/>
+          </a:fontRef>
+        </p:style>
+        <p:txBody>
+          <a:bodyPr rtlCol="0" anchor="ctr"/>
+          <a:lstStyle/>
+          <a:p>
+            <a:pPr algn="ctr"/>
+            <a:r>
+              <a:rPr lang="en-US" dirty="0" err="1"/>
+              <a:t>a</a:t>
+            </a:r>
+            <a:r>
+              <a:rPr lang="en-US" dirty="0" err="1" smtClean="0"/>
+              <a:t>bc</a:t>
+            </a:r>
+            <a:r>
+              <a:rPr lang="en-US" dirty="0" smtClean="0"/>
+              <a:t> -&gt; Shift = 0</a:t>
+            </a:r>
+          </a:p>
+          <a:p>
+            <a:pPr algn="ctr"/>
+            <a:r>
+              <a:rPr lang="en-US" dirty="0" smtClean="0"/>
+              <a:t>Current </a:t>
+            </a:r>
+            <a:r>
+              <a:rPr lang="en-US" dirty="0" err="1" smtClean="0"/>
+              <a:t>pos</a:t>
+            </a:r>
+            <a:r>
+              <a:rPr lang="en-US" dirty="0" smtClean="0"/>
+              <a:t> = 7</a:t>
+            </a:r>
+          </a:p>
+          <a:p>
+            <a:pPr algn="ctr"/>
+            <a:r>
+              <a:rPr lang="en-US" dirty="0" smtClean="0"/>
+              <a:t>We will check the SPMB[7+3-6] and see it is set and match the suffix of our pattern -&gt; there is a full match</a:t>
+            </a:r>
+            <a:endParaRPr lang="en-US" dirty="0"/>
+          </a:p>
+        </p:txBody>
+      </p:sp>
+      <p:sp>
+        <p:nvSpPr>
+          <p:cNvPr id="34" name="Rectangle 33"/>
+          <p:cNvSpPr/>
+          <p:nvPr/>
+        </p:nvSpPr>
+        <p:spPr>
+          <a:xfrm>
+            <a:off x="652794" y="4918320"/>
+            <a:ext cx="4454610" cy="420130"/>
+          </a:xfrm>
+          <a:prstGeom prst="rect">
+            <a:avLst/>
+          </a:prstGeom>
+        </p:spPr>
+        <p:style>
+          <a:lnRef idx="2">
+            <a:schemeClr val="accent1">
+              <a:shade val="50000"/>
+            </a:schemeClr>
+          </a:lnRef>
+          <a:fillRef idx="1">
+            <a:schemeClr val="accent1"/>
+          </a:fillRef>
+          <a:effectRef idx="0">
+            <a:schemeClr val="accent1"/>
+          </a:effectRef>
+          <a:fontRef idx="minor">
+            <a:schemeClr val="lt1"/>
+          </a:fontRef>
+        </p:style>
+        <p:txBody>
+          <a:bodyPr rtlCol="0" anchor="ctr"/>
+          <a:lstStyle/>
+          <a:p>
+            <a:pPr algn="ctr"/>
+            <a:r>
+              <a:rPr lang="en-US" dirty="0" smtClean="0"/>
+              <a:t>SPMB</a:t>
+            </a:r>
+            <a:endParaRPr lang="en-US" dirty="0"/>
+          </a:p>
+        </p:txBody>
+      </p:sp>
+      <p:sp>
+        <p:nvSpPr>
+          <p:cNvPr id="35" name="Rectangle 34"/>
+          <p:cNvSpPr/>
+          <p:nvPr/>
+        </p:nvSpPr>
+        <p:spPr>
+          <a:xfrm>
+            <a:off x="652793" y="5354926"/>
+            <a:ext cx="405714" cy="313037"/>
+          </a:xfrm>
+          <a:prstGeom prst="rect">
+            <a:avLst/>
+          </a:prstGeom>
+        </p:spPr>
+        <p:style>
+          <a:lnRef idx="2">
+            <a:schemeClr val="accent1">
+              <a:shade val="50000"/>
+            </a:schemeClr>
+          </a:lnRef>
+          <a:fillRef idx="1">
+            <a:schemeClr val="accent1"/>
+          </a:fillRef>
+          <a:effectRef idx="0">
+            <a:schemeClr val="accent1"/>
+          </a:effectRef>
+          <a:fontRef idx="minor">
+            <a:schemeClr val="lt1"/>
+          </a:fontRef>
+        </p:style>
+        <p:txBody>
+          <a:bodyPr rtlCol="0" anchor="ctr"/>
+          <a:lstStyle/>
+          <a:p>
+            <a:pPr algn="ctr"/>
+            <a:r>
+              <a:rPr lang="en-US" dirty="0"/>
+              <a:t>0</a:t>
+            </a:r>
+          </a:p>
+        </p:txBody>
+      </p:sp>
+      <p:sp>
+        <p:nvSpPr>
+          <p:cNvPr id="36" name="Rectangle 35"/>
+          <p:cNvSpPr/>
+          <p:nvPr/>
+        </p:nvSpPr>
+        <p:spPr>
+          <a:xfrm>
+            <a:off x="652793" y="5684439"/>
+            <a:ext cx="405714" cy="313037"/>
+          </a:xfrm>
+          <a:prstGeom prst="rect">
+            <a:avLst/>
+          </a:prstGeom>
+        </p:spPr>
+        <p:style>
+          <a:lnRef idx="2">
+            <a:schemeClr val="accent1">
+              <a:shade val="50000"/>
+            </a:schemeClr>
+          </a:lnRef>
+          <a:fillRef idx="1">
+            <a:schemeClr val="accent1"/>
+          </a:fillRef>
+          <a:effectRef idx="0">
+            <a:schemeClr val="accent1"/>
+          </a:effectRef>
+          <a:fontRef idx="minor">
+            <a:schemeClr val="lt1"/>
+          </a:fontRef>
+        </p:style>
+        <p:txBody>
+          <a:bodyPr rtlCol="0" anchor="ctr"/>
+          <a:lstStyle/>
+          <a:p>
+            <a:pPr algn="ctr"/>
+            <a:r>
+              <a:rPr lang="en-US" dirty="0" smtClean="0"/>
+              <a:t>0</a:t>
+            </a:r>
+            <a:endParaRPr lang="en-US" dirty="0"/>
+          </a:p>
+        </p:txBody>
+      </p:sp>
+      <p:sp>
+        <p:nvSpPr>
+          <p:cNvPr id="37" name="Rectangle 36"/>
+          <p:cNvSpPr/>
+          <p:nvPr/>
+        </p:nvSpPr>
+        <p:spPr>
+          <a:xfrm>
+            <a:off x="1057477" y="5354926"/>
+            <a:ext cx="405714" cy="313037"/>
+          </a:xfrm>
+          <a:prstGeom prst="rect">
+            <a:avLst/>
+          </a:prstGeom>
+        </p:spPr>
+        <p:style>
+          <a:lnRef idx="2">
+            <a:schemeClr val="accent1">
+              <a:shade val="50000"/>
+            </a:schemeClr>
+          </a:lnRef>
+          <a:fillRef idx="1">
+            <a:schemeClr val="accent1"/>
+          </a:fillRef>
+          <a:effectRef idx="0">
+            <a:schemeClr val="accent1"/>
+          </a:effectRef>
+          <a:fontRef idx="minor">
+            <a:schemeClr val="lt1"/>
+          </a:fontRef>
+        </p:style>
+        <p:txBody>
+          <a:bodyPr rtlCol="0" anchor="ctr"/>
+          <a:lstStyle/>
+          <a:p>
+            <a:pPr algn="ctr"/>
+            <a:r>
+              <a:rPr lang="en-US" dirty="0"/>
+              <a:t>1</a:t>
+            </a:r>
+          </a:p>
+        </p:txBody>
+      </p:sp>
+      <p:sp>
+        <p:nvSpPr>
+          <p:cNvPr id="38" name="Rectangle 37"/>
+          <p:cNvSpPr/>
+          <p:nvPr/>
+        </p:nvSpPr>
+        <p:spPr>
+          <a:xfrm>
+            <a:off x="1057477" y="5684439"/>
+            <a:ext cx="405714" cy="313037"/>
+          </a:xfrm>
+          <a:prstGeom prst="rect">
+            <a:avLst/>
+          </a:prstGeom>
+        </p:spPr>
+        <p:style>
+          <a:lnRef idx="2">
+            <a:schemeClr val="accent1">
+              <a:shade val="50000"/>
+            </a:schemeClr>
+          </a:lnRef>
+          <a:fillRef idx="1">
+            <a:schemeClr val="accent1"/>
+          </a:fillRef>
+          <a:effectRef idx="0">
+            <a:schemeClr val="accent1"/>
+          </a:effectRef>
+          <a:fontRef idx="minor">
+            <a:schemeClr val="lt1"/>
+          </a:fontRef>
+        </p:style>
+        <p:txBody>
+          <a:bodyPr rtlCol="0" anchor="ctr"/>
+          <a:lstStyle/>
+          <a:p>
+            <a:pPr algn="ctr"/>
+            <a:r>
+              <a:rPr lang="en-US" dirty="0" smtClean="0"/>
+              <a:t>0</a:t>
+            </a:r>
+            <a:endParaRPr lang="en-US" dirty="0"/>
+          </a:p>
+        </p:txBody>
+      </p:sp>
+      <p:sp>
+        <p:nvSpPr>
+          <p:cNvPr id="39" name="Rectangle 38"/>
+          <p:cNvSpPr/>
+          <p:nvPr/>
+        </p:nvSpPr>
+        <p:spPr>
+          <a:xfrm>
+            <a:off x="1462160" y="5354926"/>
+            <a:ext cx="405714" cy="313037"/>
+          </a:xfrm>
+          <a:prstGeom prst="rect">
+            <a:avLst/>
+          </a:prstGeom>
+        </p:spPr>
+        <p:style>
+          <a:lnRef idx="2">
+            <a:schemeClr val="accent1">
+              <a:shade val="50000"/>
+            </a:schemeClr>
+          </a:lnRef>
+          <a:fillRef idx="1">
+            <a:schemeClr val="accent1"/>
+          </a:fillRef>
+          <a:effectRef idx="0">
+            <a:schemeClr val="accent1"/>
+          </a:effectRef>
+          <a:fontRef idx="minor">
+            <a:schemeClr val="lt1"/>
+          </a:fontRef>
+        </p:style>
+        <p:txBody>
+          <a:bodyPr rtlCol="0" anchor="ctr"/>
+          <a:lstStyle/>
+          <a:p>
+            <a:pPr algn="ctr"/>
+            <a:r>
+              <a:rPr lang="en-US" dirty="0"/>
+              <a:t>2</a:t>
+            </a:r>
+          </a:p>
+        </p:txBody>
+      </p:sp>
+      <p:sp>
+        <p:nvSpPr>
+          <p:cNvPr id="40" name="Rectangle 39"/>
+          <p:cNvSpPr/>
+          <p:nvPr/>
+        </p:nvSpPr>
+        <p:spPr>
+          <a:xfrm>
+            <a:off x="1462160" y="5684439"/>
+            <a:ext cx="405714" cy="313037"/>
+          </a:xfrm>
+          <a:prstGeom prst="rect">
+            <a:avLst/>
+          </a:prstGeom>
+        </p:spPr>
+        <p:style>
+          <a:lnRef idx="2">
+            <a:schemeClr val="accent1">
+              <a:shade val="50000"/>
+            </a:schemeClr>
+          </a:lnRef>
+          <a:fillRef idx="1">
+            <a:schemeClr val="accent1"/>
+          </a:fillRef>
+          <a:effectRef idx="0">
+            <a:schemeClr val="accent1"/>
+          </a:effectRef>
+          <a:fontRef idx="minor">
+            <a:schemeClr val="lt1"/>
+          </a:fontRef>
+        </p:style>
+        <p:txBody>
+          <a:bodyPr rtlCol="0" anchor="ctr"/>
+          <a:lstStyle/>
+          <a:p>
+            <a:pPr algn="ctr"/>
+            <a:r>
+              <a:rPr lang="en-US" dirty="0" smtClean="0"/>
+              <a:t>0</a:t>
+            </a:r>
+            <a:endParaRPr lang="en-US" dirty="0"/>
+          </a:p>
+        </p:txBody>
+      </p:sp>
+      <p:sp>
+        <p:nvSpPr>
+          <p:cNvPr id="41" name="Rectangle 40"/>
+          <p:cNvSpPr/>
+          <p:nvPr/>
+        </p:nvSpPr>
+        <p:spPr>
+          <a:xfrm>
+            <a:off x="1867874" y="5354926"/>
+            <a:ext cx="405714" cy="313037"/>
+          </a:xfrm>
+          <a:prstGeom prst="rect">
+            <a:avLst/>
+          </a:prstGeom>
+        </p:spPr>
+        <p:style>
+          <a:lnRef idx="2">
+            <a:schemeClr val="accent1">
+              <a:shade val="50000"/>
+            </a:schemeClr>
+          </a:lnRef>
+          <a:fillRef idx="1">
+            <a:schemeClr val="accent1"/>
+          </a:fillRef>
+          <a:effectRef idx="0">
+            <a:schemeClr val="accent1"/>
+          </a:effectRef>
+          <a:fontRef idx="minor">
+            <a:schemeClr val="lt1"/>
+          </a:fontRef>
+        </p:style>
+        <p:txBody>
+          <a:bodyPr rtlCol="0" anchor="ctr"/>
+          <a:lstStyle/>
+          <a:p>
+            <a:pPr algn="ctr"/>
+            <a:r>
+              <a:rPr lang="en-US" dirty="0"/>
+              <a:t>3</a:t>
+            </a:r>
+          </a:p>
+        </p:txBody>
+      </p:sp>
+      <p:sp>
+        <p:nvSpPr>
+          <p:cNvPr id="42" name="Rectangle 41"/>
+          <p:cNvSpPr/>
+          <p:nvPr/>
+        </p:nvSpPr>
+        <p:spPr>
+          <a:xfrm>
+            <a:off x="2272558" y="5354926"/>
+            <a:ext cx="405714" cy="313037"/>
+          </a:xfrm>
+          <a:prstGeom prst="rect">
+            <a:avLst/>
+          </a:prstGeom>
+        </p:spPr>
+        <p:style>
+          <a:lnRef idx="2">
+            <a:schemeClr val="accent1">
+              <a:shade val="50000"/>
+            </a:schemeClr>
+          </a:lnRef>
+          <a:fillRef idx="1">
+            <a:schemeClr val="accent1"/>
+          </a:fillRef>
+          <a:effectRef idx="0">
+            <a:schemeClr val="accent1"/>
+          </a:effectRef>
+          <a:fontRef idx="minor">
+            <a:schemeClr val="lt1"/>
+          </a:fontRef>
+        </p:style>
+        <p:txBody>
+          <a:bodyPr rtlCol="0" anchor="ctr"/>
+          <a:lstStyle/>
+          <a:p>
+            <a:pPr algn="ctr"/>
+            <a:r>
+              <a:rPr lang="en-US" dirty="0"/>
+              <a:t>4</a:t>
+            </a:r>
+          </a:p>
+        </p:txBody>
+      </p:sp>
+      <p:sp>
+        <p:nvSpPr>
+          <p:cNvPr id="43" name="Rectangle 42"/>
+          <p:cNvSpPr/>
+          <p:nvPr/>
+        </p:nvSpPr>
+        <p:spPr>
+          <a:xfrm>
+            <a:off x="2272558" y="5684439"/>
+            <a:ext cx="405714" cy="313037"/>
+          </a:xfrm>
+          <a:prstGeom prst="rect">
+            <a:avLst/>
+          </a:prstGeom>
+        </p:spPr>
+        <p:style>
+          <a:lnRef idx="2">
+            <a:schemeClr val="accent1">
+              <a:shade val="50000"/>
+            </a:schemeClr>
+          </a:lnRef>
+          <a:fillRef idx="1">
+            <a:schemeClr val="accent1"/>
+          </a:fillRef>
+          <a:effectRef idx="0">
+            <a:schemeClr val="accent1"/>
+          </a:effectRef>
+          <a:fontRef idx="minor">
+            <a:schemeClr val="lt1"/>
+          </a:fontRef>
+        </p:style>
+        <p:txBody>
+          <a:bodyPr rtlCol="0" anchor="ctr"/>
+          <a:lstStyle/>
+          <a:p>
+            <a:pPr algn="ctr"/>
+            <a:r>
+              <a:rPr lang="en-US" dirty="0" smtClean="0"/>
+              <a:t>1</a:t>
+            </a:r>
+            <a:endParaRPr lang="en-US" dirty="0"/>
+          </a:p>
+        </p:txBody>
+      </p:sp>
+      <p:sp>
+        <p:nvSpPr>
+          <p:cNvPr id="44" name="Rectangle 43"/>
+          <p:cNvSpPr/>
+          <p:nvPr/>
+        </p:nvSpPr>
+        <p:spPr>
+          <a:xfrm>
+            <a:off x="2677241" y="5354926"/>
+            <a:ext cx="405714" cy="313037"/>
+          </a:xfrm>
+          <a:prstGeom prst="rect">
+            <a:avLst/>
+          </a:prstGeom>
+        </p:spPr>
+        <p:style>
+          <a:lnRef idx="2">
+            <a:schemeClr val="accent1">
+              <a:shade val="50000"/>
+            </a:schemeClr>
+          </a:lnRef>
+          <a:fillRef idx="1">
+            <a:schemeClr val="accent1"/>
+          </a:fillRef>
+          <a:effectRef idx="0">
+            <a:schemeClr val="accent1"/>
+          </a:effectRef>
+          <a:fontRef idx="minor">
+            <a:schemeClr val="lt1"/>
+          </a:fontRef>
+        </p:style>
+        <p:txBody>
+          <a:bodyPr rtlCol="0" anchor="ctr"/>
+          <a:lstStyle/>
+          <a:p>
+            <a:pPr algn="ctr"/>
+            <a:r>
+              <a:rPr lang="en-US" dirty="0"/>
+              <a:t>5</a:t>
+            </a:r>
+          </a:p>
+        </p:txBody>
+      </p:sp>
+      <p:sp>
+        <p:nvSpPr>
+          <p:cNvPr id="45" name="Rectangle 44"/>
+          <p:cNvSpPr/>
+          <p:nvPr/>
+        </p:nvSpPr>
+        <p:spPr>
+          <a:xfrm>
+            <a:off x="2677241" y="5684439"/>
+            <a:ext cx="402623" cy="313037"/>
+          </a:xfrm>
+          <a:prstGeom prst="rect">
+            <a:avLst/>
+          </a:prstGeom>
+        </p:spPr>
+        <p:style>
+          <a:lnRef idx="2">
+            <a:schemeClr val="accent1">
+              <a:shade val="50000"/>
+            </a:schemeClr>
+          </a:lnRef>
+          <a:fillRef idx="1">
+            <a:schemeClr val="accent1"/>
+          </a:fillRef>
+          <a:effectRef idx="0">
+            <a:schemeClr val="accent1"/>
+          </a:effectRef>
+          <a:fontRef idx="minor">
+            <a:schemeClr val="lt1"/>
+          </a:fontRef>
+        </p:style>
+        <p:txBody>
+          <a:bodyPr rtlCol="0" anchor="ctr"/>
+          <a:lstStyle/>
+          <a:p>
+            <a:pPr algn="ctr"/>
+            <a:endParaRPr lang="en-US" dirty="0"/>
+          </a:p>
+        </p:txBody>
+      </p:sp>
+      <p:sp>
+        <p:nvSpPr>
+          <p:cNvPr id="46" name="Rectangle 45"/>
+          <p:cNvSpPr/>
+          <p:nvPr/>
+        </p:nvSpPr>
+        <p:spPr>
+          <a:xfrm>
+            <a:off x="3082955" y="5354926"/>
+            <a:ext cx="405714" cy="313037"/>
+          </a:xfrm>
+          <a:prstGeom prst="rect">
+            <a:avLst/>
+          </a:prstGeom>
+        </p:spPr>
+        <p:style>
+          <a:lnRef idx="2">
+            <a:schemeClr val="accent1">
+              <a:shade val="50000"/>
+            </a:schemeClr>
+          </a:lnRef>
+          <a:fillRef idx="1">
+            <a:schemeClr val="accent1"/>
+          </a:fillRef>
+          <a:effectRef idx="0">
+            <a:schemeClr val="accent1"/>
+          </a:effectRef>
+          <a:fontRef idx="minor">
+            <a:schemeClr val="lt1"/>
+          </a:fontRef>
+        </p:style>
+        <p:txBody>
+          <a:bodyPr rtlCol="0" anchor="ctr"/>
+          <a:lstStyle/>
+          <a:p>
+            <a:pPr algn="ctr"/>
+            <a:r>
+              <a:rPr lang="en-US" dirty="0"/>
+              <a:t>6</a:t>
+            </a:r>
+          </a:p>
+        </p:txBody>
+      </p:sp>
+      <p:sp>
+        <p:nvSpPr>
+          <p:cNvPr id="47" name="Rectangle 46"/>
+          <p:cNvSpPr/>
+          <p:nvPr/>
+        </p:nvSpPr>
+        <p:spPr>
+          <a:xfrm>
+            <a:off x="3082955" y="5684439"/>
+            <a:ext cx="405714" cy="313037"/>
+          </a:xfrm>
+          <a:prstGeom prst="rect">
+            <a:avLst/>
+          </a:prstGeom>
+        </p:spPr>
+        <p:style>
+          <a:lnRef idx="2">
+            <a:schemeClr val="accent1">
+              <a:shade val="50000"/>
+            </a:schemeClr>
+          </a:lnRef>
+          <a:fillRef idx="1">
+            <a:schemeClr val="accent1"/>
+          </a:fillRef>
+          <a:effectRef idx="0">
+            <a:schemeClr val="accent1"/>
+          </a:effectRef>
+          <a:fontRef idx="minor">
+            <a:schemeClr val="lt1"/>
+          </a:fontRef>
+        </p:style>
+        <p:txBody>
+          <a:bodyPr rtlCol="0" anchor="ctr"/>
+          <a:lstStyle/>
+          <a:p>
+            <a:pPr algn="ctr"/>
+            <a:endParaRPr lang="en-US" dirty="0"/>
+          </a:p>
+        </p:txBody>
+      </p:sp>
+      <p:sp>
+        <p:nvSpPr>
+          <p:cNvPr id="48" name="Rectangle 47"/>
+          <p:cNvSpPr/>
+          <p:nvPr/>
+        </p:nvSpPr>
+        <p:spPr>
+          <a:xfrm>
+            <a:off x="3487639" y="5354926"/>
+            <a:ext cx="405714" cy="313037"/>
+          </a:xfrm>
+          <a:prstGeom prst="rect">
+            <a:avLst/>
+          </a:prstGeom>
+        </p:spPr>
+        <p:style>
+          <a:lnRef idx="2">
+            <a:schemeClr val="accent1">
+              <a:shade val="50000"/>
+            </a:schemeClr>
+          </a:lnRef>
+          <a:fillRef idx="1">
+            <a:schemeClr val="accent1"/>
+          </a:fillRef>
+          <a:effectRef idx="0">
+            <a:schemeClr val="accent1"/>
+          </a:effectRef>
+          <a:fontRef idx="minor">
+            <a:schemeClr val="lt1"/>
+          </a:fontRef>
+        </p:style>
+        <p:txBody>
+          <a:bodyPr rtlCol="0" anchor="ctr"/>
+          <a:lstStyle/>
+          <a:p>
+            <a:pPr algn="ctr"/>
+            <a:r>
+              <a:rPr lang="en-US" dirty="0"/>
+              <a:t>7</a:t>
+            </a:r>
+          </a:p>
+        </p:txBody>
+      </p:sp>
+      <p:sp>
+        <p:nvSpPr>
+          <p:cNvPr id="49" name="Rectangle 48"/>
+          <p:cNvSpPr/>
+          <p:nvPr/>
+        </p:nvSpPr>
+        <p:spPr>
+          <a:xfrm>
+            <a:off x="3892322" y="5354926"/>
+            <a:ext cx="405714" cy="313037"/>
+          </a:xfrm>
+          <a:prstGeom prst="rect">
+            <a:avLst/>
+          </a:prstGeom>
+        </p:spPr>
+        <p:style>
+          <a:lnRef idx="2">
+            <a:schemeClr val="accent1">
+              <a:shade val="50000"/>
+            </a:schemeClr>
+          </a:lnRef>
+          <a:fillRef idx="1">
+            <a:schemeClr val="accent1"/>
+          </a:fillRef>
+          <a:effectRef idx="0">
+            <a:schemeClr val="accent1"/>
+          </a:effectRef>
+          <a:fontRef idx="minor">
+            <a:schemeClr val="lt1"/>
+          </a:fontRef>
+        </p:style>
+        <p:txBody>
+          <a:bodyPr rtlCol="0" anchor="ctr"/>
+          <a:lstStyle/>
+          <a:p>
+            <a:pPr algn="ctr"/>
+            <a:r>
+              <a:rPr lang="en-US" dirty="0"/>
+              <a:t>8</a:t>
+            </a:r>
+          </a:p>
+        </p:txBody>
+      </p:sp>
+      <p:sp>
+        <p:nvSpPr>
+          <p:cNvPr id="50" name="Rectangle 49"/>
+          <p:cNvSpPr/>
+          <p:nvPr/>
+        </p:nvSpPr>
+        <p:spPr>
+          <a:xfrm>
+            <a:off x="3892322" y="5684439"/>
+            <a:ext cx="405714" cy="313037"/>
+          </a:xfrm>
+          <a:prstGeom prst="rect">
+            <a:avLst/>
+          </a:prstGeom>
+        </p:spPr>
+        <p:style>
+          <a:lnRef idx="2">
+            <a:schemeClr val="accent1">
+              <a:shade val="50000"/>
+            </a:schemeClr>
+          </a:lnRef>
+          <a:fillRef idx="1">
+            <a:schemeClr val="accent1"/>
+          </a:fillRef>
+          <a:effectRef idx="0">
+            <a:schemeClr val="accent1"/>
+          </a:effectRef>
+          <a:fontRef idx="minor">
+            <a:schemeClr val="lt1"/>
+          </a:fontRef>
+        </p:style>
+        <p:txBody>
+          <a:bodyPr rtlCol="0" anchor="ctr"/>
+          <a:lstStyle/>
+          <a:p>
+            <a:pPr algn="ctr"/>
+            <a:endParaRPr lang="en-US" dirty="0"/>
+          </a:p>
+        </p:txBody>
+      </p:sp>
+      <p:sp>
+        <p:nvSpPr>
+          <p:cNvPr id="51" name="Rectangle 50"/>
+          <p:cNvSpPr/>
+          <p:nvPr/>
+        </p:nvSpPr>
+        <p:spPr>
+          <a:xfrm>
+            <a:off x="4297006" y="5354926"/>
+            <a:ext cx="405714" cy="313037"/>
+          </a:xfrm>
+          <a:prstGeom prst="rect">
+            <a:avLst/>
+          </a:prstGeom>
+        </p:spPr>
+        <p:style>
+          <a:lnRef idx="2">
+            <a:schemeClr val="accent1">
+              <a:shade val="50000"/>
+            </a:schemeClr>
+          </a:lnRef>
+          <a:fillRef idx="1">
+            <a:schemeClr val="accent1"/>
+          </a:fillRef>
+          <a:effectRef idx="0">
+            <a:schemeClr val="accent1"/>
+          </a:effectRef>
+          <a:fontRef idx="minor">
+            <a:schemeClr val="lt1"/>
+          </a:fontRef>
+        </p:style>
+        <p:txBody>
+          <a:bodyPr rtlCol="0" anchor="ctr"/>
+          <a:lstStyle/>
+          <a:p>
+            <a:pPr algn="ctr"/>
+            <a:r>
+              <a:rPr lang="en-US" dirty="0"/>
+              <a:t>9</a:t>
+            </a:r>
+          </a:p>
+        </p:txBody>
+      </p:sp>
+      <p:sp>
+        <p:nvSpPr>
+          <p:cNvPr id="52" name="Rectangle 51"/>
+          <p:cNvSpPr/>
+          <p:nvPr/>
+        </p:nvSpPr>
+        <p:spPr>
+          <a:xfrm>
+            <a:off x="1861701" y="5684438"/>
+            <a:ext cx="405714" cy="313037"/>
+          </a:xfrm>
+          <a:prstGeom prst="rect">
+            <a:avLst/>
+          </a:prstGeom>
+        </p:spPr>
+        <p:style>
+          <a:lnRef idx="2">
+            <a:schemeClr val="accent1">
+              <a:shade val="50000"/>
+            </a:schemeClr>
+          </a:lnRef>
+          <a:fillRef idx="1">
+            <a:schemeClr val="accent1"/>
+          </a:fillRef>
+          <a:effectRef idx="0">
+            <a:schemeClr val="accent1"/>
+          </a:effectRef>
+          <a:fontRef idx="minor">
+            <a:schemeClr val="lt1"/>
+          </a:fontRef>
+        </p:style>
+        <p:txBody>
+          <a:bodyPr rtlCol="0" anchor="ctr"/>
+          <a:lstStyle/>
+          <a:p>
+            <a:pPr algn="ctr"/>
+            <a:r>
+              <a:rPr lang="en-US" dirty="0" smtClean="0"/>
+              <a:t>0</a:t>
+            </a:r>
+            <a:endParaRPr lang="en-US" dirty="0"/>
+          </a:p>
+        </p:txBody>
+      </p:sp>
+      <p:sp>
+        <p:nvSpPr>
+          <p:cNvPr id="53" name="Rectangle 52"/>
+          <p:cNvSpPr/>
+          <p:nvPr/>
+        </p:nvSpPr>
+        <p:spPr>
+          <a:xfrm>
+            <a:off x="3502697" y="5676159"/>
+            <a:ext cx="405714" cy="313037"/>
+          </a:xfrm>
+          <a:prstGeom prst="rect">
+            <a:avLst/>
+          </a:prstGeom>
+        </p:spPr>
+        <p:style>
+          <a:lnRef idx="2">
+            <a:schemeClr val="accent1">
+              <a:shade val="50000"/>
+            </a:schemeClr>
+          </a:lnRef>
+          <a:fillRef idx="1">
+            <a:schemeClr val="accent1"/>
+          </a:fillRef>
+          <a:effectRef idx="0">
+            <a:schemeClr val="accent1"/>
+          </a:effectRef>
+          <a:fontRef idx="minor">
+            <a:schemeClr val="lt1"/>
+          </a:fontRef>
+        </p:style>
+        <p:txBody>
+          <a:bodyPr rtlCol="0" anchor="ctr"/>
+          <a:lstStyle/>
+          <a:p>
+            <a:pPr algn="ctr"/>
+            <a:endParaRPr lang="en-US" dirty="0"/>
+          </a:p>
+        </p:txBody>
+      </p:sp>
+      <p:sp>
+        <p:nvSpPr>
+          <p:cNvPr id="54" name="Rectangle 53"/>
+          <p:cNvSpPr/>
+          <p:nvPr/>
+        </p:nvSpPr>
+        <p:spPr>
+          <a:xfrm>
+            <a:off x="9231879" y="5676159"/>
+            <a:ext cx="405714" cy="313037"/>
+          </a:xfrm>
+          <a:prstGeom prst="rect">
+            <a:avLst/>
+          </a:prstGeom>
+        </p:spPr>
+        <p:style>
+          <a:lnRef idx="2">
+            <a:schemeClr val="accent1">
+              <a:shade val="50000"/>
+            </a:schemeClr>
+          </a:lnRef>
+          <a:fillRef idx="1">
+            <a:schemeClr val="accent1"/>
+          </a:fillRef>
+          <a:effectRef idx="0">
+            <a:schemeClr val="accent1"/>
+          </a:effectRef>
+          <a:fontRef idx="minor">
+            <a:schemeClr val="lt1"/>
+          </a:fontRef>
+        </p:style>
+        <p:txBody>
+          <a:bodyPr rtlCol="0" anchor="ctr"/>
+          <a:lstStyle/>
+          <a:p>
+            <a:pPr algn="ctr"/>
+            <a:endParaRPr lang="en-US" dirty="0"/>
+          </a:p>
+        </p:txBody>
+      </p:sp>
+      <p:sp>
+        <p:nvSpPr>
+          <p:cNvPr id="55" name="Rectangle 54"/>
+          <p:cNvSpPr/>
+          <p:nvPr/>
+        </p:nvSpPr>
+        <p:spPr>
+          <a:xfrm>
+            <a:off x="9636563" y="5346646"/>
+            <a:ext cx="405714" cy="313037"/>
+          </a:xfrm>
+          <a:prstGeom prst="rect">
+            <a:avLst/>
+          </a:prstGeom>
+        </p:spPr>
+        <p:style>
+          <a:lnRef idx="2">
+            <a:schemeClr val="accent1">
+              <a:shade val="50000"/>
+            </a:schemeClr>
+          </a:lnRef>
+          <a:fillRef idx="1">
+            <a:schemeClr val="accent1"/>
+          </a:fillRef>
+          <a:effectRef idx="0">
+            <a:schemeClr val="accent1"/>
+          </a:effectRef>
+          <a:fontRef idx="minor">
+            <a:schemeClr val="lt1"/>
+          </a:fontRef>
+        </p:style>
+        <p:txBody>
+          <a:bodyPr rtlCol="0" anchor="ctr"/>
+          <a:lstStyle/>
+          <a:p>
+            <a:pPr algn="ctr"/>
+            <a:r>
+              <a:rPr lang="en-US" sz="1600" dirty="0"/>
+              <a:t>10</a:t>
+            </a:r>
+          </a:p>
+        </p:txBody>
+      </p:sp>
+      <p:sp>
+        <p:nvSpPr>
+          <p:cNvPr id="56" name="Rectangle 55"/>
+          <p:cNvSpPr/>
+          <p:nvPr/>
+        </p:nvSpPr>
+        <p:spPr>
+          <a:xfrm>
+            <a:off x="9647508" y="5702715"/>
+            <a:ext cx="405714" cy="313037"/>
+          </a:xfrm>
+          <a:prstGeom prst="rect">
+            <a:avLst/>
+          </a:prstGeom>
+        </p:spPr>
+        <p:style>
+          <a:lnRef idx="2">
+            <a:schemeClr val="accent1">
+              <a:shade val="50000"/>
+            </a:schemeClr>
+          </a:lnRef>
+          <a:fillRef idx="1">
+            <a:schemeClr val="accent1"/>
+          </a:fillRef>
+          <a:effectRef idx="0">
+            <a:schemeClr val="accent1"/>
+          </a:effectRef>
+          <a:fontRef idx="minor">
+            <a:schemeClr val="lt1"/>
+          </a:fontRef>
+        </p:style>
+        <p:txBody>
+          <a:bodyPr rtlCol="0" anchor="ctr"/>
+          <a:lstStyle/>
+          <a:p>
+            <a:pPr algn="ctr"/>
+            <a:endParaRPr lang="en-US" dirty="0"/>
+          </a:p>
+        </p:txBody>
+      </p:sp>
+      <p:sp>
+        <p:nvSpPr>
+          <p:cNvPr id="57" name="Rectangle 56"/>
+          <p:cNvSpPr/>
+          <p:nvPr/>
+        </p:nvSpPr>
+        <p:spPr>
+          <a:xfrm>
+            <a:off x="5587667" y="4901760"/>
+            <a:ext cx="4454610" cy="420130"/>
+          </a:xfrm>
+          <a:prstGeom prst="rect">
+            <a:avLst/>
+          </a:prstGeom>
+        </p:spPr>
+        <p:style>
+          <a:lnRef idx="2">
+            <a:schemeClr val="accent1">
+              <a:shade val="50000"/>
+            </a:schemeClr>
+          </a:lnRef>
+          <a:fillRef idx="1">
+            <a:schemeClr val="accent1"/>
+          </a:fillRef>
+          <a:effectRef idx="0">
+            <a:schemeClr val="accent1"/>
+          </a:effectRef>
+          <a:fontRef idx="minor">
+            <a:schemeClr val="lt1"/>
+          </a:fontRef>
+        </p:style>
+        <p:txBody>
+          <a:bodyPr rtlCol="0" anchor="ctr"/>
+          <a:lstStyle/>
+          <a:p>
+            <a:pPr algn="ctr"/>
+            <a:r>
+              <a:rPr lang="en-US" dirty="0" smtClean="0"/>
+              <a:t>PMB</a:t>
+            </a:r>
+            <a:endParaRPr lang="en-US" dirty="0"/>
+          </a:p>
+        </p:txBody>
+      </p:sp>
+      <p:sp>
+        <p:nvSpPr>
+          <p:cNvPr id="58" name="Rectangle 57"/>
+          <p:cNvSpPr/>
+          <p:nvPr/>
+        </p:nvSpPr>
+        <p:spPr>
+          <a:xfrm>
+            <a:off x="5587666" y="5338366"/>
+            <a:ext cx="405714" cy="313037"/>
+          </a:xfrm>
+          <a:prstGeom prst="rect">
+            <a:avLst/>
+          </a:prstGeom>
+        </p:spPr>
+        <p:style>
+          <a:lnRef idx="2">
+            <a:schemeClr val="accent1">
+              <a:shade val="50000"/>
+            </a:schemeClr>
+          </a:lnRef>
+          <a:fillRef idx="1">
+            <a:schemeClr val="accent1"/>
+          </a:fillRef>
+          <a:effectRef idx="0">
+            <a:schemeClr val="accent1"/>
+          </a:effectRef>
+          <a:fontRef idx="minor">
+            <a:schemeClr val="lt1"/>
+          </a:fontRef>
+        </p:style>
+        <p:txBody>
+          <a:bodyPr rtlCol="0" anchor="ctr"/>
+          <a:lstStyle/>
+          <a:p>
+            <a:pPr algn="ctr"/>
+            <a:r>
+              <a:rPr lang="en-US" dirty="0"/>
+              <a:t>0</a:t>
+            </a:r>
+          </a:p>
+        </p:txBody>
+      </p:sp>
+      <p:sp>
+        <p:nvSpPr>
+          <p:cNvPr id="59" name="Rectangle 58"/>
+          <p:cNvSpPr/>
+          <p:nvPr/>
+        </p:nvSpPr>
+        <p:spPr>
+          <a:xfrm>
+            <a:off x="5587666" y="5667879"/>
+            <a:ext cx="405714" cy="313037"/>
+          </a:xfrm>
+          <a:prstGeom prst="rect">
+            <a:avLst/>
+          </a:prstGeom>
+        </p:spPr>
+        <p:style>
+          <a:lnRef idx="2">
+            <a:schemeClr val="accent1">
+              <a:shade val="50000"/>
+            </a:schemeClr>
+          </a:lnRef>
+          <a:fillRef idx="1">
+            <a:schemeClr val="accent1"/>
+          </a:fillRef>
+          <a:effectRef idx="0">
+            <a:schemeClr val="accent1"/>
+          </a:effectRef>
+          <a:fontRef idx="minor">
+            <a:schemeClr val="lt1"/>
+          </a:fontRef>
+        </p:style>
+        <p:txBody>
+          <a:bodyPr rtlCol="0" anchor="ctr"/>
+          <a:lstStyle/>
+          <a:p>
+            <a:pPr algn="ctr"/>
+            <a:r>
+              <a:rPr lang="en-US" dirty="0" smtClean="0"/>
+              <a:t>0</a:t>
+            </a:r>
+            <a:endParaRPr lang="en-US" dirty="0"/>
+          </a:p>
+        </p:txBody>
+      </p:sp>
+      <p:sp>
+        <p:nvSpPr>
+          <p:cNvPr id="60" name="Rectangle 59"/>
+          <p:cNvSpPr/>
+          <p:nvPr/>
+        </p:nvSpPr>
+        <p:spPr>
+          <a:xfrm>
+            <a:off x="5992350" y="5338366"/>
+            <a:ext cx="405714" cy="313037"/>
+          </a:xfrm>
+          <a:prstGeom prst="rect">
+            <a:avLst/>
+          </a:prstGeom>
+        </p:spPr>
+        <p:style>
+          <a:lnRef idx="2">
+            <a:schemeClr val="accent1">
+              <a:shade val="50000"/>
+            </a:schemeClr>
+          </a:lnRef>
+          <a:fillRef idx="1">
+            <a:schemeClr val="accent1"/>
+          </a:fillRef>
+          <a:effectRef idx="0">
+            <a:schemeClr val="accent1"/>
+          </a:effectRef>
+          <a:fontRef idx="minor">
+            <a:schemeClr val="lt1"/>
+          </a:fontRef>
+        </p:style>
+        <p:txBody>
+          <a:bodyPr rtlCol="0" anchor="ctr"/>
+          <a:lstStyle/>
+          <a:p>
+            <a:pPr algn="ctr"/>
+            <a:r>
+              <a:rPr lang="en-US" dirty="0"/>
+              <a:t>1</a:t>
+            </a:r>
+          </a:p>
+        </p:txBody>
+      </p:sp>
+      <p:sp>
+        <p:nvSpPr>
+          <p:cNvPr id="61" name="Rectangle 60"/>
+          <p:cNvSpPr/>
+          <p:nvPr/>
+        </p:nvSpPr>
+        <p:spPr>
+          <a:xfrm>
+            <a:off x="5992350" y="5667879"/>
+            <a:ext cx="405714" cy="313037"/>
+          </a:xfrm>
+          <a:prstGeom prst="rect">
+            <a:avLst/>
+          </a:prstGeom>
+        </p:spPr>
+        <p:style>
+          <a:lnRef idx="2">
+            <a:schemeClr val="accent1">
+              <a:shade val="50000"/>
+            </a:schemeClr>
+          </a:lnRef>
+          <a:fillRef idx="1">
+            <a:schemeClr val="accent1"/>
+          </a:fillRef>
+          <a:effectRef idx="0">
+            <a:schemeClr val="accent1"/>
+          </a:effectRef>
+          <a:fontRef idx="minor">
+            <a:schemeClr val="lt1"/>
+          </a:fontRef>
+        </p:style>
+        <p:txBody>
+          <a:bodyPr rtlCol="0" anchor="ctr"/>
+          <a:lstStyle/>
+          <a:p>
+            <a:pPr algn="ctr"/>
+            <a:r>
+              <a:rPr lang="en-US" dirty="0" smtClean="0"/>
+              <a:t>0</a:t>
+            </a:r>
+            <a:endParaRPr lang="en-US" dirty="0"/>
+          </a:p>
+        </p:txBody>
+      </p:sp>
+      <p:sp>
+        <p:nvSpPr>
+          <p:cNvPr id="62" name="Rectangle 61"/>
+          <p:cNvSpPr/>
+          <p:nvPr/>
+        </p:nvSpPr>
+        <p:spPr>
+          <a:xfrm>
+            <a:off x="6397033" y="5338366"/>
+            <a:ext cx="405714" cy="313037"/>
+          </a:xfrm>
+          <a:prstGeom prst="rect">
+            <a:avLst/>
+          </a:prstGeom>
+        </p:spPr>
+        <p:style>
+          <a:lnRef idx="2">
+            <a:schemeClr val="accent1">
+              <a:shade val="50000"/>
+            </a:schemeClr>
+          </a:lnRef>
+          <a:fillRef idx="1">
+            <a:schemeClr val="accent1"/>
+          </a:fillRef>
+          <a:effectRef idx="0">
+            <a:schemeClr val="accent1"/>
+          </a:effectRef>
+          <a:fontRef idx="minor">
+            <a:schemeClr val="lt1"/>
+          </a:fontRef>
+        </p:style>
+        <p:txBody>
+          <a:bodyPr rtlCol="0" anchor="ctr"/>
+          <a:lstStyle/>
+          <a:p>
+            <a:pPr algn="ctr"/>
+            <a:r>
+              <a:rPr lang="en-US" dirty="0"/>
+              <a:t>2</a:t>
+            </a:r>
+          </a:p>
+        </p:txBody>
+      </p:sp>
+      <p:sp>
+        <p:nvSpPr>
+          <p:cNvPr id="63" name="Rectangle 62"/>
+          <p:cNvSpPr/>
+          <p:nvPr/>
+        </p:nvSpPr>
+        <p:spPr>
+          <a:xfrm>
+            <a:off x="6397033" y="5667879"/>
+            <a:ext cx="405714" cy="313037"/>
+          </a:xfrm>
+          <a:prstGeom prst="rect">
+            <a:avLst/>
+          </a:prstGeom>
+        </p:spPr>
+        <p:style>
+          <a:lnRef idx="2">
+            <a:schemeClr val="accent1">
+              <a:shade val="50000"/>
+            </a:schemeClr>
+          </a:lnRef>
+          <a:fillRef idx="1">
+            <a:schemeClr val="accent1"/>
+          </a:fillRef>
+          <a:effectRef idx="0">
+            <a:schemeClr val="accent1"/>
+          </a:effectRef>
+          <a:fontRef idx="minor">
+            <a:schemeClr val="lt1"/>
+          </a:fontRef>
+        </p:style>
+        <p:txBody>
+          <a:bodyPr rtlCol="0" anchor="ctr"/>
+          <a:lstStyle/>
+          <a:p>
+            <a:pPr algn="ctr"/>
+            <a:r>
+              <a:rPr lang="en-US" dirty="0" smtClean="0"/>
+              <a:t>0</a:t>
+            </a:r>
+            <a:endParaRPr lang="en-US" dirty="0"/>
+          </a:p>
+        </p:txBody>
+      </p:sp>
+      <p:sp>
+        <p:nvSpPr>
+          <p:cNvPr id="64" name="Rectangle 63"/>
+          <p:cNvSpPr/>
+          <p:nvPr/>
+        </p:nvSpPr>
+        <p:spPr>
+          <a:xfrm>
+            <a:off x="6802747" y="5338366"/>
+            <a:ext cx="405714" cy="313037"/>
+          </a:xfrm>
+          <a:prstGeom prst="rect">
+            <a:avLst/>
+          </a:prstGeom>
+        </p:spPr>
+        <p:style>
+          <a:lnRef idx="2">
+            <a:schemeClr val="accent1">
+              <a:shade val="50000"/>
+            </a:schemeClr>
+          </a:lnRef>
+          <a:fillRef idx="1">
+            <a:schemeClr val="accent1"/>
+          </a:fillRef>
+          <a:effectRef idx="0">
+            <a:schemeClr val="accent1"/>
+          </a:effectRef>
+          <a:fontRef idx="minor">
+            <a:schemeClr val="lt1"/>
+          </a:fontRef>
+        </p:style>
+        <p:txBody>
+          <a:bodyPr rtlCol="0" anchor="ctr"/>
+          <a:lstStyle/>
+          <a:p>
+            <a:pPr algn="ctr"/>
+            <a:r>
+              <a:rPr lang="en-US" dirty="0"/>
+              <a:t>3</a:t>
+            </a:r>
+          </a:p>
+        </p:txBody>
+      </p:sp>
+      <p:sp>
+        <p:nvSpPr>
+          <p:cNvPr id="65" name="Rectangle 64"/>
+          <p:cNvSpPr/>
+          <p:nvPr/>
+        </p:nvSpPr>
+        <p:spPr>
+          <a:xfrm>
+            <a:off x="7207431" y="5338366"/>
+            <a:ext cx="405714" cy="313037"/>
+          </a:xfrm>
+          <a:prstGeom prst="rect">
+            <a:avLst/>
+          </a:prstGeom>
+        </p:spPr>
+        <p:style>
+          <a:lnRef idx="2">
+            <a:schemeClr val="accent1">
+              <a:shade val="50000"/>
+            </a:schemeClr>
+          </a:lnRef>
+          <a:fillRef idx="1">
+            <a:schemeClr val="accent1"/>
+          </a:fillRef>
+          <a:effectRef idx="0">
+            <a:schemeClr val="accent1"/>
+          </a:effectRef>
+          <a:fontRef idx="minor">
+            <a:schemeClr val="lt1"/>
+          </a:fontRef>
+        </p:style>
+        <p:txBody>
+          <a:bodyPr rtlCol="0" anchor="ctr"/>
+          <a:lstStyle/>
+          <a:p>
+            <a:pPr algn="ctr"/>
+            <a:r>
+              <a:rPr lang="en-US" dirty="0"/>
+              <a:t>4</a:t>
+            </a:r>
+          </a:p>
+        </p:txBody>
+      </p:sp>
+      <p:sp>
+        <p:nvSpPr>
+          <p:cNvPr id="66" name="Rectangle 65"/>
+          <p:cNvSpPr/>
+          <p:nvPr/>
+        </p:nvSpPr>
+        <p:spPr>
+          <a:xfrm>
+            <a:off x="7207431" y="5667879"/>
+            <a:ext cx="405714" cy="313037"/>
+          </a:xfrm>
+          <a:prstGeom prst="rect">
+            <a:avLst/>
+          </a:prstGeom>
+        </p:spPr>
+        <p:style>
+          <a:lnRef idx="2">
+            <a:schemeClr val="accent1">
+              <a:shade val="50000"/>
+            </a:schemeClr>
+          </a:lnRef>
+          <a:fillRef idx="1">
+            <a:schemeClr val="accent1"/>
+          </a:fillRef>
+          <a:effectRef idx="0">
+            <a:schemeClr val="accent1"/>
+          </a:effectRef>
+          <a:fontRef idx="minor">
+            <a:schemeClr val="lt1"/>
+          </a:fontRef>
+        </p:style>
+        <p:txBody>
+          <a:bodyPr rtlCol="0" anchor="ctr"/>
+          <a:lstStyle/>
+          <a:p>
+            <a:pPr algn="ctr"/>
+            <a:r>
+              <a:rPr lang="en-US" dirty="0"/>
+              <a:t>0</a:t>
+            </a:r>
+          </a:p>
+        </p:txBody>
+      </p:sp>
+      <p:sp>
+        <p:nvSpPr>
+          <p:cNvPr id="67" name="Rectangle 66"/>
+          <p:cNvSpPr/>
+          <p:nvPr/>
+        </p:nvSpPr>
+        <p:spPr>
+          <a:xfrm>
+            <a:off x="7612114" y="5338366"/>
+            <a:ext cx="405714" cy="313037"/>
+          </a:xfrm>
+          <a:prstGeom prst="rect">
+            <a:avLst/>
+          </a:prstGeom>
+        </p:spPr>
+        <p:style>
+          <a:lnRef idx="2">
+            <a:schemeClr val="accent1">
+              <a:shade val="50000"/>
+            </a:schemeClr>
+          </a:lnRef>
+          <a:fillRef idx="1">
+            <a:schemeClr val="accent1"/>
+          </a:fillRef>
+          <a:effectRef idx="0">
+            <a:schemeClr val="accent1"/>
+          </a:effectRef>
+          <a:fontRef idx="minor">
+            <a:schemeClr val="lt1"/>
+          </a:fontRef>
+        </p:style>
+        <p:txBody>
+          <a:bodyPr rtlCol="0" anchor="ctr"/>
+          <a:lstStyle/>
+          <a:p>
+            <a:pPr algn="ctr"/>
+            <a:r>
+              <a:rPr lang="en-US" dirty="0"/>
+              <a:t>5</a:t>
+            </a:r>
+          </a:p>
+        </p:txBody>
+      </p:sp>
+      <p:sp>
+        <p:nvSpPr>
+          <p:cNvPr id="68" name="Rectangle 67"/>
+          <p:cNvSpPr/>
+          <p:nvPr/>
+        </p:nvSpPr>
+        <p:spPr>
+          <a:xfrm>
+            <a:off x="7612114" y="5667879"/>
+            <a:ext cx="402623" cy="313037"/>
+          </a:xfrm>
+          <a:prstGeom prst="rect">
+            <a:avLst/>
+          </a:prstGeom>
+        </p:spPr>
+        <p:style>
+          <a:lnRef idx="2">
+            <a:schemeClr val="accent1">
+              <a:shade val="50000"/>
+            </a:schemeClr>
+          </a:lnRef>
+          <a:fillRef idx="1">
+            <a:schemeClr val="accent1"/>
+          </a:fillRef>
+          <a:effectRef idx="0">
+            <a:schemeClr val="accent1"/>
+          </a:effectRef>
+          <a:fontRef idx="minor">
+            <a:schemeClr val="lt1"/>
+          </a:fontRef>
+        </p:style>
+        <p:txBody>
+          <a:bodyPr rtlCol="0" anchor="ctr"/>
+          <a:lstStyle/>
+          <a:p>
+            <a:pPr algn="ctr"/>
+            <a:endParaRPr lang="en-US" dirty="0"/>
+          </a:p>
+        </p:txBody>
+      </p:sp>
+      <p:sp>
+        <p:nvSpPr>
+          <p:cNvPr id="69" name="Rectangle 68"/>
+          <p:cNvSpPr/>
+          <p:nvPr/>
+        </p:nvSpPr>
+        <p:spPr>
+          <a:xfrm>
+            <a:off x="8017828" y="5338366"/>
+            <a:ext cx="405714" cy="313037"/>
+          </a:xfrm>
+          <a:prstGeom prst="rect">
+            <a:avLst/>
+          </a:prstGeom>
+        </p:spPr>
+        <p:style>
+          <a:lnRef idx="2">
+            <a:schemeClr val="accent1">
+              <a:shade val="50000"/>
+            </a:schemeClr>
+          </a:lnRef>
+          <a:fillRef idx="1">
+            <a:schemeClr val="accent1"/>
+          </a:fillRef>
+          <a:effectRef idx="0">
+            <a:schemeClr val="accent1"/>
+          </a:effectRef>
+          <a:fontRef idx="minor">
+            <a:schemeClr val="lt1"/>
+          </a:fontRef>
+        </p:style>
+        <p:txBody>
+          <a:bodyPr rtlCol="0" anchor="ctr"/>
+          <a:lstStyle/>
+          <a:p>
+            <a:pPr algn="ctr"/>
+            <a:r>
+              <a:rPr lang="en-US" dirty="0"/>
+              <a:t>6</a:t>
+            </a:r>
+          </a:p>
+        </p:txBody>
+      </p:sp>
+      <p:sp>
+        <p:nvSpPr>
+          <p:cNvPr id="70" name="Rectangle 69"/>
+          <p:cNvSpPr/>
+          <p:nvPr/>
+        </p:nvSpPr>
+        <p:spPr>
+          <a:xfrm>
+            <a:off x="8017828" y="5667879"/>
+            <a:ext cx="405714" cy="313037"/>
+          </a:xfrm>
+          <a:prstGeom prst="rect">
+            <a:avLst/>
+          </a:prstGeom>
+        </p:spPr>
+        <p:style>
+          <a:lnRef idx="2">
+            <a:schemeClr val="accent1">
+              <a:shade val="50000"/>
+            </a:schemeClr>
+          </a:lnRef>
+          <a:fillRef idx="1">
+            <a:schemeClr val="accent1"/>
+          </a:fillRef>
+          <a:effectRef idx="0">
+            <a:schemeClr val="accent1"/>
+          </a:effectRef>
+          <a:fontRef idx="minor">
+            <a:schemeClr val="lt1"/>
+          </a:fontRef>
+        </p:style>
+        <p:txBody>
+          <a:bodyPr rtlCol="0" anchor="ctr"/>
+          <a:lstStyle/>
+          <a:p>
+            <a:pPr algn="ctr"/>
+            <a:endParaRPr lang="en-US" dirty="0"/>
+          </a:p>
+        </p:txBody>
+      </p:sp>
+      <p:sp>
+        <p:nvSpPr>
+          <p:cNvPr id="71" name="Rectangle 70"/>
+          <p:cNvSpPr/>
+          <p:nvPr/>
+        </p:nvSpPr>
+        <p:spPr>
+          <a:xfrm>
+            <a:off x="8422512" y="5338366"/>
+            <a:ext cx="405714" cy="313037"/>
+          </a:xfrm>
+          <a:prstGeom prst="rect">
+            <a:avLst/>
+          </a:prstGeom>
+        </p:spPr>
+        <p:style>
+          <a:lnRef idx="2">
+            <a:schemeClr val="accent1">
+              <a:shade val="50000"/>
+            </a:schemeClr>
+          </a:lnRef>
+          <a:fillRef idx="1">
+            <a:schemeClr val="accent1"/>
+          </a:fillRef>
+          <a:effectRef idx="0">
+            <a:schemeClr val="accent1"/>
+          </a:effectRef>
+          <a:fontRef idx="minor">
+            <a:schemeClr val="lt1"/>
+          </a:fontRef>
+        </p:style>
+        <p:txBody>
+          <a:bodyPr rtlCol="0" anchor="ctr"/>
+          <a:lstStyle/>
+          <a:p>
+            <a:pPr algn="ctr"/>
+            <a:r>
+              <a:rPr lang="en-US" dirty="0"/>
+              <a:t>7</a:t>
+            </a:r>
+          </a:p>
+        </p:txBody>
+      </p:sp>
+      <p:sp>
+        <p:nvSpPr>
+          <p:cNvPr id="72" name="Rectangle 71"/>
+          <p:cNvSpPr/>
+          <p:nvPr/>
+        </p:nvSpPr>
+        <p:spPr>
+          <a:xfrm>
+            <a:off x="8827195" y="5338366"/>
+            <a:ext cx="405714" cy="313037"/>
+          </a:xfrm>
+          <a:prstGeom prst="rect">
+            <a:avLst/>
+          </a:prstGeom>
+        </p:spPr>
+        <p:style>
+          <a:lnRef idx="2">
+            <a:schemeClr val="accent1">
+              <a:shade val="50000"/>
+            </a:schemeClr>
+          </a:lnRef>
+          <a:fillRef idx="1">
+            <a:schemeClr val="accent1"/>
+          </a:fillRef>
+          <a:effectRef idx="0">
+            <a:schemeClr val="accent1"/>
+          </a:effectRef>
+          <a:fontRef idx="minor">
+            <a:schemeClr val="lt1"/>
+          </a:fontRef>
+        </p:style>
+        <p:txBody>
+          <a:bodyPr rtlCol="0" anchor="ctr"/>
+          <a:lstStyle/>
+          <a:p>
+            <a:pPr algn="ctr"/>
+            <a:r>
+              <a:rPr lang="en-US" dirty="0"/>
+              <a:t>8</a:t>
+            </a:r>
+          </a:p>
+        </p:txBody>
+      </p:sp>
+      <p:sp>
+        <p:nvSpPr>
+          <p:cNvPr id="73" name="Rectangle 72"/>
+          <p:cNvSpPr/>
+          <p:nvPr/>
+        </p:nvSpPr>
+        <p:spPr>
+          <a:xfrm>
+            <a:off x="8827195" y="5667879"/>
+            <a:ext cx="405714" cy="313037"/>
+          </a:xfrm>
+          <a:prstGeom prst="rect">
+            <a:avLst/>
+          </a:prstGeom>
+        </p:spPr>
+        <p:style>
+          <a:lnRef idx="2">
+            <a:schemeClr val="accent1">
+              <a:shade val="50000"/>
+            </a:schemeClr>
+          </a:lnRef>
+          <a:fillRef idx="1">
+            <a:schemeClr val="accent1"/>
+          </a:fillRef>
+          <a:effectRef idx="0">
+            <a:schemeClr val="accent1"/>
+          </a:effectRef>
+          <a:fontRef idx="minor">
+            <a:schemeClr val="lt1"/>
+          </a:fontRef>
+        </p:style>
+        <p:txBody>
+          <a:bodyPr rtlCol="0" anchor="ctr"/>
+          <a:lstStyle/>
+          <a:p>
+            <a:pPr algn="ctr"/>
+            <a:endParaRPr lang="en-US" dirty="0"/>
+          </a:p>
+        </p:txBody>
+      </p:sp>
+      <p:sp>
+        <p:nvSpPr>
+          <p:cNvPr id="74" name="Rectangle 73"/>
+          <p:cNvSpPr/>
+          <p:nvPr/>
+        </p:nvSpPr>
+        <p:spPr>
+          <a:xfrm>
+            <a:off x="9231879" y="5338366"/>
+            <a:ext cx="405714" cy="313037"/>
+          </a:xfrm>
+          <a:prstGeom prst="rect">
+            <a:avLst/>
+          </a:prstGeom>
+        </p:spPr>
+        <p:style>
+          <a:lnRef idx="2">
+            <a:schemeClr val="accent1">
+              <a:shade val="50000"/>
+            </a:schemeClr>
+          </a:lnRef>
+          <a:fillRef idx="1">
+            <a:schemeClr val="accent1"/>
+          </a:fillRef>
+          <a:effectRef idx="0">
+            <a:schemeClr val="accent1"/>
+          </a:effectRef>
+          <a:fontRef idx="minor">
+            <a:schemeClr val="lt1"/>
+          </a:fontRef>
+        </p:style>
+        <p:txBody>
+          <a:bodyPr rtlCol="0" anchor="ctr"/>
+          <a:lstStyle/>
+          <a:p>
+            <a:pPr algn="ctr"/>
+            <a:r>
+              <a:rPr lang="en-US" dirty="0"/>
+              <a:t>9</a:t>
+            </a:r>
+          </a:p>
+        </p:txBody>
+      </p:sp>
+      <p:sp>
+        <p:nvSpPr>
+          <p:cNvPr id="75" name="Rectangle 74"/>
+          <p:cNvSpPr/>
+          <p:nvPr/>
+        </p:nvSpPr>
+        <p:spPr>
+          <a:xfrm>
+            <a:off x="6796574" y="5667878"/>
+            <a:ext cx="405714" cy="313037"/>
+          </a:xfrm>
+          <a:prstGeom prst="rect">
+            <a:avLst/>
+          </a:prstGeom>
+        </p:spPr>
+        <p:style>
+          <a:lnRef idx="2">
+            <a:schemeClr val="accent1">
+              <a:shade val="50000"/>
+            </a:schemeClr>
+          </a:lnRef>
+          <a:fillRef idx="1">
+            <a:schemeClr val="accent1"/>
+          </a:fillRef>
+          <a:effectRef idx="0">
+            <a:schemeClr val="accent1"/>
+          </a:effectRef>
+          <a:fontRef idx="minor">
+            <a:schemeClr val="lt1"/>
+          </a:fontRef>
+        </p:style>
+        <p:txBody>
+          <a:bodyPr rtlCol="0" anchor="ctr"/>
+          <a:lstStyle/>
+          <a:p>
+            <a:pPr algn="ctr"/>
+            <a:r>
+              <a:rPr lang="en-US" dirty="0" smtClean="0"/>
+              <a:t>0</a:t>
+            </a:r>
+            <a:endParaRPr lang="en-US" dirty="0"/>
+          </a:p>
+        </p:txBody>
+      </p:sp>
+      <p:sp>
+        <p:nvSpPr>
+          <p:cNvPr id="76" name="Rectangle 75"/>
+          <p:cNvSpPr/>
+          <p:nvPr/>
+        </p:nvSpPr>
+        <p:spPr>
+          <a:xfrm>
+            <a:off x="8437570" y="5659599"/>
+            <a:ext cx="405714" cy="313037"/>
+          </a:xfrm>
+          <a:prstGeom prst="rect">
+            <a:avLst/>
+          </a:prstGeom>
+        </p:spPr>
+        <p:style>
+          <a:lnRef idx="2">
+            <a:schemeClr val="accent1">
+              <a:shade val="50000"/>
+            </a:schemeClr>
+          </a:lnRef>
+          <a:fillRef idx="1">
+            <a:schemeClr val="accent1"/>
+          </a:fillRef>
+          <a:effectRef idx="0">
+            <a:schemeClr val="accent1"/>
+          </a:effectRef>
+          <a:fontRef idx="minor">
+            <a:schemeClr val="lt1"/>
+          </a:fontRef>
+        </p:style>
+        <p:txBody>
+          <a:bodyPr rtlCol="0" anchor="ctr"/>
+          <a:lstStyle/>
+          <a:p>
+            <a:pPr algn="ctr"/>
+            <a:endParaRPr lang="en-US" dirty="0"/>
+          </a:p>
+        </p:txBody>
+      </p:sp>
     </p:spTree>
     <p:extLst>
       <p:ext uri="{BB962C8B-B14F-4D97-AF65-F5344CB8AC3E}">
-        <p14:creationId xmlns:p14="http://schemas.microsoft.com/office/powerpoint/2010/main" val="2485596063"/>
+        <p14:creationId xmlns:p14="http://schemas.microsoft.com/office/powerpoint/2010/main" val="377619259"/>
       </p:ext>
     </p:extLst>
   </p:cSld>

</xml_diff>